<commit_message>
Update pkgdown documentation 20f4c95f88dcbb42f521dd1cd003ee332b903e95
</commit_message>
<xml_diff>
--- a/main/reference/output.pptx
+++ b/main/reference/output.pptx
@@ -6,6 +6,7 @@
   </p:sldMasterIdLst>
   <p:sldIdLst>
     <p:sldId id="256" r:id="rId2"/>
+    <p:sldId id="257" r:id="rId7"/>
   </p:sldIdLst>
   <p:sldSz cx="12192000" cy="6858000"/>
   <p:notesSz cx="6858000" cy="9144000"/>
@@ -3384,6 +3385,2889 @@
 </p:sld>
 </file>
 
+<file path=ppt/slides/slide2.xml><?xml version="1.0" encoding="utf-8"?>
+<p:sld xmlns:a="http://schemas.openxmlformats.org/drawingml/2006/main" xmlns:r="http://schemas.openxmlformats.org/officeDocument/2006/relationships" xmlns:p="http://schemas.openxmlformats.org/presentationml/2006/main">
+  <p:cSld>
+    <p:spTree>
+      <p:nvGrpSpPr>
+        <p:cNvPr id="1" name=""/>
+        <p:cNvGrpSpPr/>
+        <p:nvPr/>
+      </p:nvGrpSpPr>
+      <p:grpSpPr>
+        <a:xfrm>
+          <a:off x="0" y="0"/>
+          <a:ext cx="0" cy="0"/>
+          <a:chOff x="0" y="0"/>
+          <a:chExt cx="0" cy="0"/>
+        </a:xfrm>
+      </p:grpSpPr>
+      <p:graphicFrame>
+        <p:nvGraphicFramePr>
+          <p:cNvPr id="2" name=""/>
+          <p:cNvGraphicFramePr>
+            <a:graphicFrameLocks noGrp="true"/>
+          </p:cNvGraphicFramePr>
+          <p:nvPr/>
+        </p:nvGraphicFramePr>
+        <p:xfrm rot="0">
+          <a:off x="3052097" y="1165860"/>
+          <a:ext cx="3657600" cy="2743200"/>
+        </p:xfrm>
+        <a:graphic>
+          <a:graphicData uri="http://schemas.openxmlformats.org/drawingml/2006/table">
+            <a:tbl>
+              <a:tblPr/>
+              <a:tblGrid>
+                <a:gridCol w="1014348"/>
+                <a:gridCol w="1268365"/>
+                <a:gridCol w="1268365"/>
+                <a:gridCol w="1268365"/>
+                <a:gridCol w="1268365"/>
+              </a:tblGrid>
+              <a:tr h="261603">
+                <a:tc>
+                  <a:txBody>
+                    <a:bodyPr/>
+                    <a:lstStyle/>
+                    <a:p>
+                      <a:pPr algn="ctr" marL="63500" marR="63500">
+                        <a:lnSpc>
+                          <a:spcPct val="100000"/>
+                        </a:lnSpc>
+                        <a:spcBef>
+                          <a:spcPts val="300"/>
+                        </a:spcBef>
+                        <a:spcAft>
+                          <a:spcPts val="300"/>
+                        </a:spcAft>
+                        <a:buNone/>
+                      </a:pPr>
+                      <a:r>
+                        <a:rPr cap="none" sz="1400" i="0" b="1" u="none">
+                          <a:solidFill>
+                            <a:srgbClr val="FFFFFF">
+                              <a:alpha val="100000"/>
+                            </a:srgbClr>
+                          </a:solidFill>
+                          <a:latin typeface="arial"/>
+                          <a:cs typeface="arial"/>
+                          <a:ea typeface="arial"/>
+                          <a:sym typeface="arial"/>
+                        </a:rPr>
+                        <a:t/>
+                      </a:r>
+                      <a:r>
+                        <a:rPr cap="none" sz="1400" i="0" b="1" u="none" baseline="40000">
+                          <a:solidFill>
+                            <a:srgbClr val="FFFFFF">
+                              <a:alpha val="100000"/>
+                            </a:srgbClr>
+                          </a:solidFill>
+                          <a:latin typeface="arial"/>
+                          <a:cs typeface="arial"/>
+                          <a:ea typeface="arial"/>
+                          <a:sym typeface="arial"/>
+                        </a:rPr>
+                        <a:t> </a:t>
+                      </a:r>
+                    </a:p>
+                  </a:txBody>
+                  <a:tcPr anchor="ctr" marB="38100" marT="38100" marR="0" marL="0">
+                    <a:lnL algn="ctr" cmpd="sng" cap="flat" w="0">
+                      <a:noFill/>
+                      <a:prstDash val="solid"/>
+                    </a:lnL>
+                    <a:lnR algn="ctr" cmpd="sng" cap="flat" w="0">
+                      <a:noFill/>
+                      <a:prstDash val="solid"/>
+                    </a:lnR>
+                    <a:lnT algn="ctr" cmpd="sng" cap="flat" w="0">
+                      <a:noFill/>
+                      <a:prstDash val="solid"/>
+                    </a:lnT>
+                    <a:lnB algn="ctr" cmpd="sng" cap="flat" w="0">
+                      <a:noFill/>
+                      <a:prstDash val="solid"/>
+                    </a:lnB>
+                    <a:solidFill>
+                      <a:srgbClr val="ED4A0D">
+                        <a:alpha val="100000"/>
+                      </a:srgbClr>
+                    </a:solidFill>
+                  </a:tcPr>
+                </a:tc>
+                <a:tc>
+                  <a:txBody>
+                    <a:bodyPr/>
+                    <a:lstStyle/>
+                    <a:p>
+                      <a:pPr algn="ctr" marL="63500" marR="63500">
+                        <a:lnSpc>
+                          <a:spcPct val="100000"/>
+                        </a:lnSpc>
+                        <a:spcBef>
+                          <a:spcPts val="300"/>
+                        </a:spcBef>
+                        <a:spcAft>
+                          <a:spcPts val="300"/>
+                        </a:spcAft>
+                        <a:buNone/>
+                      </a:pPr>
+                      <a:r>
+                        <a:rPr cap="none" sz="1400" i="0" b="1" u="none">
+                          <a:solidFill>
+                            <a:srgbClr val="FFFFFF">
+                              <a:alpha val="100000"/>
+                            </a:srgbClr>
+                          </a:solidFill>
+                          <a:latin typeface="arial"/>
+                          <a:cs typeface="arial"/>
+                          <a:ea typeface="arial"/>
+                          <a:sym typeface="arial"/>
+                        </a:rPr>
+                        <a:t>A: Drug X</a:t>
+                      </a:r>
+                    </a:p>
+                  </a:txBody>
+                  <a:tcPr anchor="ctr" marB="38100" marT="38100" marR="0" marL="0">
+                    <a:lnL algn="ctr" cmpd="sng" cap="flat" w="0">
+                      <a:noFill/>
+                      <a:prstDash val="solid"/>
+                    </a:lnL>
+                    <a:lnR algn="ctr" cmpd="sng" cap="flat" w="0">
+                      <a:noFill/>
+                      <a:prstDash val="solid"/>
+                    </a:lnR>
+                    <a:lnT algn="ctr" cmpd="sng" cap="flat" w="0">
+                      <a:noFill/>
+                      <a:prstDash val="solid"/>
+                    </a:lnT>
+                    <a:lnB algn="ctr" cmpd="sng" cap="flat" w="0">
+                      <a:noFill/>
+                      <a:prstDash val="solid"/>
+                    </a:lnB>
+                    <a:solidFill>
+                      <a:srgbClr val="ED4A0D">
+                        <a:alpha val="100000"/>
+                      </a:srgbClr>
+                    </a:solidFill>
+                  </a:tcPr>
+                </a:tc>
+                <a:tc>
+                  <a:txBody>
+                    <a:bodyPr/>
+                    <a:lstStyle/>
+                    <a:p>
+                      <a:pPr algn="ctr" marL="63500" marR="63500">
+                        <a:lnSpc>
+                          <a:spcPct val="100000"/>
+                        </a:lnSpc>
+                        <a:spcBef>
+                          <a:spcPts val="300"/>
+                        </a:spcBef>
+                        <a:spcAft>
+                          <a:spcPts val="300"/>
+                        </a:spcAft>
+                        <a:buNone/>
+                      </a:pPr>
+                      <a:r>
+                        <a:rPr cap="none" sz="1400" i="0" b="1" u="none">
+                          <a:solidFill>
+                            <a:srgbClr val="FFFFFF">
+                              <a:alpha val="100000"/>
+                            </a:srgbClr>
+                          </a:solidFill>
+                          <a:latin typeface="arial"/>
+                          <a:cs typeface="arial"/>
+                          <a:ea typeface="arial"/>
+                          <a:sym typeface="arial"/>
+                        </a:rPr>
+                        <a:t>B: Placebo</a:t>
+                      </a:r>
+                    </a:p>
+                  </a:txBody>
+                  <a:tcPr anchor="ctr" marB="38100" marT="38100" marR="0" marL="0">
+                    <a:lnL algn="ctr" cmpd="sng" cap="flat" w="0">
+                      <a:noFill/>
+                      <a:prstDash val="solid"/>
+                    </a:lnL>
+                    <a:lnR algn="ctr" cmpd="sng" cap="flat" w="0">
+                      <a:noFill/>
+                      <a:prstDash val="solid"/>
+                    </a:lnR>
+                    <a:lnT algn="ctr" cmpd="sng" cap="flat" w="0">
+                      <a:noFill/>
+                      <a:prstDash val="solid"/>
+                    </a:lnT>
+                    <a:lnB algn="ctr" cmpd="sng" cap="flat" w="0">
+                      <a:noFill/>
+                      <a:prstDash val="solid"/>
+                    </a:lnB>
+                    <a:solidFill>
+                      <a:srgbClr val="ED4A0D">
+                        <a:alpha val="100000"/>
+                      </a:srgbClr>
+                    </a:solidFill>
+                  </a:tcPr>
+                </a:tc>
+                <a:tc>
+                  <a:txBody>
+                    <a:bodyPr/>
+                    <a:lstStyle/>
+                    <a:p>
+                      <a:pPr algn="ctr" marL="63500" marR="63500">
+                        <a:lnSpc>
+                          <a:spcPct val="100000"/>
+                        </a:lnSpc>
+                        <a:spcBef>
+                          <a:spcPts val="300"/>
+                        </a:spcBef>
+                        <a:spcAft>
+                          <a:spcPts val="300"/>
+                        </a:spcAft>
+                        <a:buNone/>
+                      </a:pPr>
+                      <a:r>
+                        <a:rPr cap="none" sz="1400" i="0" b="1" u="none">
+                          <a:solidFill>
+                            <a:srgbClr val="FFFFFF">
+                              <a:alpha val="100000"/>
+                            </a:srgbClr>
+                          </a:solidFill>
+                          <a:latin typeface="arial"/>
+                          <a:cs typeface="arial"/>
+                          <a:ea typeface="arial"/>
+                          <a:sym typeface="arial"/>
+                        </a:rPr>
+                        <a:t>C: Combination</a:t>
+                      </a:r>
+                    </a:p>
+                  </a:txBody>
+                  <a:tcPr anchor="ctr" marB="38100" marT="38100" marR="0" marL="0">
+                    <a:lnL algn="ctr" cmpd="sng" cap="flat" w="0">
+                      <a:noFill/>
+                      <a:prstDash val="solid"/>
+                    </a:lnL>
+                    <a:lnR algn="ctr" cmpd="sng" cap="flat" w="0">
+                      <a:noFill/>
+                      <a:prstDash val="solid"/>
+                    </a:lnR>
+                    <a:lnT algn="ctr" cmpd="sng" cap="flat" w="0">
+                      <a:noFill/>
+                      <a:prstDash val="solid"/>
+                    </a:lnT>
+                    <a:lnB algn="ctr" cmpd="sng" cap="flat" w="0">
+                      <a:noFill/>
+                      <a:prstDash val="solid"/>
+                    </a:lnB>
+                    <a:solidFill>
+                      <a:srgbClr val="ED4A0D">
+                        <a:alpha val="100000"/>
+                      </a:srgbClr>
+                    </a:solidFill>
+                  </a:tcPr>
+                </a:tc>
+                <a:tc>
+                  <a:txBody>
+                    <a:bodyPr/>
+                    <a:lstStyle/>
+                    <a:p>
+                      <a:pPr algn="ctr" marL="63500" marR="63500">
+                        <a:lnSpc>
+                          <a:spcPct val="100000"/>
+                        </a:lnSpc>
+                        <a:spcBef>
+                          <a:spcPts val="300"/>
+                        </a:spcBef>
+                        <a:spcAft>
+                          <a:spcPts val="300"/>
+                        </a:spcAft>
+                        <a:buNone/>
+                      </a:pPr>
+                      <a:r>
+                        <a:rPr cap="none" sz="1400" i="0" b="1" u="none">
+                          <a:solidFill>
+                            <a:srgbClr val="FFFFFF">
+                              <a:alpha val="100000"/>
+                            </a:srgbClr>
+                          </a:solidFill>
+                          <a:latin typeface="arial"/>
+                          <a:cs typeface="arial"/>
+                          <a:ea typeface="arial"/>
+                          <a:sym typeface="arial"/>
+                        </a:rPr>
+                        <a:t>All Patients</a:t>
+                      </a:r>
+                    </a:p>
+                  </a:txBody>
+                  <a:tcPr anchor="ctr" marB="38100" marT="38100" marR="0" marL="0">
+                    <a:lnL algn="ctr" cmpd="sng" cap="flat" w="0">
+                      <a:noFill/>
+                      <a:prstDash val="solid"/>
+                    </a:lnL>
+                    <a:lnR algn="ctr" cmpd="sng" cap="flat" w="0">
+                      <a:noFill/>
+                      <a:prstDash val="solid"/>
+                    </a:lnR>
+                    <a:lnT algn="ctr" cmpd="sng" cap="flat" w="0">
+                      <a:noFill/>
+                      <a:prstDash val="solid"/>
+                    </a:lnT>
+                    <a:lnB algn="ctr" cmpd="sng" cap="flat" w="0">
+                      <a:noFill/>
+                      <a:prstDash val="solid"/>
+                    </a:lnB>
+                    <a:solidFill>
+                      <a:srgbClr val="ED4A0D">
+                        <a:alpha val="100000"/>
+                      </a:srgbClr>
+                    </a:solidFill>
+                  </a:tcPr>
+                </a:tc>
+              </a:tr>
+              <a:tr h="267333">
+                <a:tc>
+                  <a:txBody>
+                    <a:bodyPr/>
+                    <a:lstStyle/>
+                    <a:p>
+                      <a:pPr algn="ctr" marL="63500" marR="63500">
+                        <a:lnSpc>
+                          <a:spcPct val="100000"/>
+                        </a:lnSpc>
+                        <a:spcBef>
+                          <a:spcPts val="300"/>
+                        </a:spcBef>
+                        <a:spcAft>
+                          <a:spcPts val="300"/>
+                        </a:spcAft>
+                        <a:buNone/>
+                      </a:pPr>
+                      <a:endParaRPr cap="none" sz="1400" i="0" b="1" u="none">
+                        <a:solidFill>
+                          <a:srgbClr val="FFFFFF">
+                            <a:alpha val="100000"/>
+                          </a:srgbClr>
+                        </a:solidFill>
+                        <a:latin typeface="arial"/>
+                        <a:cs typeface="arial"/>
+                        <a:ea typeface="arial"/>
+                        <a:sym typeface="arial"/>
+                      </a:endParaRPr>
+                      <a:r>
+                        <a:rPr cap="none" sz="1400" i="0" b="1" u="none">
+                          <a:solidFill>
+                            <a:srgbClr val="FFFFFF">
+                              <a:alpha val="100000"/>
+                            </a:srgbClr>
+                          </a:solidFill>
+                          <a:latin typeface="arial"/>
+                          <a:cs typeface="arial"/>
+                          <a:ea typeface="arial"/>
+                          <a:sym typeface="arial"/>
+                        </a:rPr>
+                        <a:t/>
+                      </a:r>
+                    </a:p>
+                  </a:txBody>
+                  <a:tcPr anchor="ctr" marB="38100" marT="38100" marR="0" marL="0">
+                    <a:lnL algn="ctr" cmpd="sng" cap="flat" w="0">
+                      <a:noFill/>
+                      <a:prstDash val="solid"/>
+                    </a:lnL>
+                    <a:lnR algn="ctr" cmpd="sng" cap="flat" w="0">
+                      <a:noFill/>
+                      <a:prstDash val="solid"/>
+                    </a:lnR>
+                    <a:lnT algn="ctr" cmpd="sng" cap="flat" w="0">
+                      <a:noFill/>
+                      <a:prstDash val="solid"/>
+                    </a:lnT>
+                    <a:lnB algn="ctr" cmpd="sng" cap="flat" w="0">
+                      <a:noFill/>
+                      <a:prstDash val="solid"/>
+                    </a:lnB>
+                    <a:solidFill>
+                      <a:srgbClr val="ED4A0D">
+                        <a:alpha val="100000"/>
+                      </a:srgbClr>
+                    </a:solidFill>
+                  </a:tcPr>
+                </a:tc>
+                <a:tc>
+                  <a:txBody>
+                    <a:bodyPr/>
+                    <a:lstStyle/>
+                    <a:p>
+                      <a:pPr algn="ctr" marL="63500" marR="63500">
+                        <a:lnSpc>
+                          <a:spcPct val="100000"/>
+                        </a:lnSpc>
+                        <a:spcBef>
+                          <a:spcPts val="300"/>
+                        </a:spcBef>
+                        <a:spcAft>
+                          <a:spcPts val="300"/>
+                        </a:spcAft>
+                        <a:buNone/>
+                      </a:pPr>
+                      <a:r>
+                        <a:rPr cap="none" sz="1400" i="0" b="1" u="none">
+                          <a:solidFill>
+                            <a:srgbClr val="FFFFFF">
+                              <a:alpha val="100000"/>
+                            </a:srgbClr>
+                          </a:solidFill>
+                          <a:latin typeface="arial"/>
+                          <a:cs typeface="arial"/>
+                          <a:ea typeface="arial"/>
+                          <a:sym typeface="arial"/>
+                        </a:rPr>
+                        <a:t>(N=134)</a:t>
+                      </a:r>
+                    </a:p>
+                  </a:txBody>
+                  <a:tcPr anchor="ctr" marB="38100" marT="38100" marR="0" marL="0">
+                    <a:lnL algn="ctr" cmpd="sng" cap="flat" w="0">
+                      <a:noFill/>
+                      <a:prstDash val="solid"/>
+                    </a:lnL>
+                    <a:lnR algn="ctr" cmpd="sng" cap="flat" w="0">
+                      <a:noFill/>
+                      <a:prstDash val="solid"/>
+                    </a:lnR>
+                    <a:lnT algn="ctr" cmpd="sng" cap="flat" w="0">
+                      <a:noFill/>
+                      <a:prstDash val="solid"/>
+                    </a:lnT>
+                    <a:lnB algn="ctr" cmpd="sng" cap="flat" w="0">
+                      <a:noFill/>
+                      <a:prstDash val="solid"/>
+                    </a:lnB>
+                    <a:solidFill>
+                      <a:srgbClr val="ED4A0D">
+                        <a:alpha val="100000"/>
+                      </a:srgbClr>
+                    </a:solidFill>
+                  </a:tcPr>
+                </a:tc>
+                <a:tc>
+                  <a:txBody>
+                    <a:bodyPr/>
+                    <a:lstStyle/>
+                    <a:p>
+                      <a:pPr algn="ctr" marL="63500" marR="63500">
+                        <a:lnSpc>
+                          <a:spcPct val="100000"/>
+                        </a:lnSpc>
+                        <a:spcBef>
+                          <a:spcPts val="300"/>
+                        </a:spcBef>
+                        <a:spcAft>
+                          <a:spcPts val="300"/>
+                        </a:spcAft>
+                        <a:buNone/>
+                      </a:pPr>
+                      <a:r>
+                        <a:rPr cap="none" sz="1400" i="0" b="1" u="none">
+                          <a:solidFill>
+                            <a:srgbClr val="FFFFFF">
+                              <a:alpha val="100000"/>
+                            </a:srgbClr>
+                          </a:solidFill>
+                          <a:latin typeface="arial"/>
+                          <a:cs typeface="arial"/>
+                          <a:ea typeface="arial"/>
+                          <a:sym typeface="arial"/>
+                        </a:rPr>
+                        <a:t>(N=134)</a:t>
+                      </a:r>
+                    </a:p>
+                  </a:txBody>
+                  <a:tcPr anchor="ctr" marB="38100" marT="38100" marR="0" marL="0">
+                    <a:lnL algn="ctr" cmpd="sng" cap="flat" w="0">
+                      <a:noFill/>
+                      <a:prstDash val="solid"/>
+                    </a:lnL>
+                    <a:lnR algn="ctr" cmpd="sng" cap="flat" w="0">
+                      <a:noFill/>
+                      <a:prstDash val="solid"/>
+                    </a:lnR>
+                    <a:lnT algn="ctr" cmpd="sng" cap="flat" w="0">
+                      <a:noFill/>
+                      <a:prstDash val="solid"/>
+                    </a:lnT>
+                    <a:lnB algn="ctr" cmpd="sng" cap="flat" w="0">
+                      <a:noFill/>
+                      <a:prstDash val="solid"/>
+                    </a:lnB>
+                    <a:solidFill>
+                      <a:srgbClr val="ED4A0D">
+                        <a:alpha val="100000"/>
+                      </a:srgbClr>
+                    </a:solidFill>
+                  </a:tcPr>
+                </a:tc>
+                <a:tc>
+                  <a:txBody>
+                    <a:bodyPr/>
+                    <a:lstStyle/>
+                    <a:p>
+                      <a:pPr algn="ctr" marL="63500" marR="63500">
+                        <a:lnSpc>
+                          <a:spcPct val="100000"/>
+                        </a:lnSpc>
+                        <a:spcBef>
+                          <a:spcPts val="300"/>
+                        </a:spcBef>
+                        <a:spcAft>
+                          <a:spcPts val="300"/>
+                        </a:spcAft>
+                        <a:buNone/>
+                      </a:pPr>
+                      <a:r>
+                        <a:rPr cap="none" sz="1400" i="0" b="1" u="none">
+                          <a:solidFill>
+                            <a:srgbClr val="FFFFFF">
+                              <a:alpha val="100000"/>
+                            </a:srgbClr>
+                          </a:solidFill>
+                          <a:latin typeface="arial"/>
+                          <a:cs typeface="arial"/>
+                          <a:ea typeface="arial"/>
+                          <a:sym typeface="arial"/>
+                        </a:rPr>
+                        <a:t>(N=132)</a:t>
+                      </a:r>
+                    </a:p>
+                  </a:txBody>
+                  <a:tcPr anchor="ctr" marB="38100" marT="38100" marR="0" marL="0">
+                    <a:lnL algn="ctr" cmpd="sng" cap="flat" w="0">
+                      <a:noFill/>
+                      <a:prstDash val="solid"/>
+                    </a:lnL>
+                    <a:lnR algn="ctr" cmpd="sng" cap="flat" w="0">
+                      <a:noFill/>
+                      <a:prstDash val="solid"/>
+                    </a:lnR>
+                    <a:lnT algn="ctr" cmpd="sng" cap="flat" w="0">
+                      <a:noFill/>
+                      <a:prstDash val="solid"/>
+                    </a:lnT>
+                    <a:lnB algn="ctr" cmpd="sng" cap="flat" w="0">
+                      <a:noFill/>
+                      <a:prstDash val="solid"/>
+                    </a:lnB>
+                    <a:solidFill>
+                      <a:srgbClr val="ED4A0D">
+                        <a:alpha val="100000"/>
+                      </a:srgbClr>
+                    </a:solidFill>
+                  </a:tcPr>
+                </a:tc>
+                <a:tc>
+                  <a:txBody>
+                    <a:bodyPr/>
+                    <a:lstStyle/>
+                    <a:p>
+                      <a:pPr algn="ctr" marL="63500" marR="63500">
+                        <a:lnSpc>
+                          <a:spcPct val="100000"/>
+                        </a:lnSpc>
+                        <a:spcBef>
+                          <a:spcPts val="300"/>
+                        </a:spcBef>
+                        <a:spcAft>
+                          <a:spcPts val="300"/>
+                        </a:spcAft>
+                        <a:buNone/>
+                      </a:pPr>
+                      <a:r>
+                        <a:rPr cap="none" sz="1400" i="0" b="1" u="none">
+                          <a:solidFill>
+                            <a:srgbClr val="FFFFFF">
+                              <a:alpha val="100000"/>
+                            </a:srgbClr>
+                          </a:solidFill>
+                          <a:latin typeface="arial"/>
+                          <a:cs typeface="arial"/>
+                          <a:ea typeface="arial"/>
+                          <a:sym typeface="arial"/>
+                        </a:rPr>
+                        <a:t>(N=400)</a:t>
+                      </a:r>
+                    </a:p>
+                  </a:txBody>
+                  <a:tcPr anchor="ctr" marB="38100" marT="38100" marR="0" marL="0">
+                    <a:lnL algn="ctr" cmpd="sng" cap="flat" w="0">
+                      <a:noFill/>
+                      <a:prstDash val="solid"/>
+                    </a:lnL>
+                    <a:lnR algn="ctr" cmpd="sng" cap="flat" w="0">
+                      <a:noFill/>
+                      <a:prstDash val="solid"/>
+                    </a:lnR>
+                    <a:lnT algn="ctr" cmpd="sng" cap="flat" w="0">
+                      <a:noFill/>
+                      <a:prstDash val="solid"/>
+                    </a:lnT>
+                    <a:lnB algn="ctr" cmpd="sng" cap="flat" w="0">
+                      <a:noFill/>
+                      <a:prstDash val="solid"/>
+                    </a:lnB>
+                    <a:solidFill>
+                      <a:srgbClr val="ED4A0D">
+                        <a:alpha val="100000"/>
+                      </a:srgbClr>
+                    </a:solidFill>
+                  </a:tcPr>
+                </a:tc>
+              </a:tr>
+              <a:tr h="209500">
+                <a:tc>
+                  <a:txBody>
+                    <a:bodyPr/>
+                    <a:lstStyle/>
+                    <a:p>
+                      <a:pPr algn="l" marL="127000" marR="63500">
+                        <a:lnSpc>
+                          <a:spcPct val="100000"/>
+                        </a:lnSpc>
+                        <a:spcBef>
+                          <a:spcPts val="300"/>
+                        </a:spcBef>
+                        <a:spcAft>
+                          <a:spcPts val="300"/>
+                        </a:spcAft>
+                        <a:buNone/>
+                      </a:pPr>
+                      <a:r>
+                        <a:rPr cap="none" sz="1200" i="0" b="0" u="none">
+                          <a:solidFill>
+                            <a:srgbClr val="000000">
+                              <a:alpha val="100000"/>
+                            </a:srgbClr>
+                          </a:solidFill>
+                          <a:latin typeface="arial"/>
+                          <a:cs typeface="arial"/>
+                          <a:ea typeface="arial"/>
+                          <a:sym typeface="arial"/>
+                        </a:rPr>
+                        <a:t>Sex</a:t>
+                      </a:r>
+                    </a:p>
+                  </a:txBody>
+                  <a:tcPr anchor="ctr" marB="38100" marT="38100" marR="0" marL="0">
+                    <a:lnL algn="ctr" cmpd="sng" cap="flat" w="0">
+                      <a:noFill/>
+                      <a:prstDash val="solid"/>
+                    </a:lnL>
+                    <a:lnR algn="ctr" cmpd="sng" cap="flat" w="0">
+                      <a:noFill/>
+                      <a:prstDash val="solid"/>
+                    </a:lnR>
+                    <a:lnT algn="ctr" cmpd="sng" cap="flat" w="0">
+                      <a:noFill/>
+                      <a:prstDash val="solid"/>
+                    </a:lnT>
+                    <a:lnB algn="ctr" cmpd="sng" cap="flat" w="0">
+                      <a:noFill/>
+                      <a:prstDash val="solid"/>
+                    </a:lnB>
+                    <a:solidFill>
+                      <a:srgbClr val="FF7D29">
+                        <a:alpha val="100000"/>
+                      </a:srgbClr>
+                    </a:solidFill>
+                  </a:tcPr>
+                </a:tc>
+                <a:tc>
+                  <a:txBody>
+                    <a:bodyPr/>
+                    <a:lstStyle/>
+                    <a:p>
+                      <a:pPr algn="ctr" marL="63500" marR="63500">
+                        <a:lnSpc>
+                          <a:spcPct val="100000"/>
+                        </a:lnSpc>
+                        <a:spcBef>
+                          <a:spcPts val="300"/>
+                        </a:spcBef>
+                        <a:spcAft>
+                          <a:spcPts val="300"/>
+                        </a:spcAft>
+                        <a:buNone/>
+                      </a:pPr>
+                      <a:endParaRPr cap="none" sz="1200" i="0" b="0" u="none">
+                        <a:solidFill>
+                          <a:srgbClr val="000000">
+                            <a:alpha val="100000"/>
+                          </a:srgbClr>
+                        </a:solidFill>
+                        <a:latin typeface="arial"/>
+                        <a:cs typeface="arial"/>
+                        <a:ea typeface="arial"/>
+                        <a:sym typeface="arial"/>
+                      </a:endParaRPr>
+                      <a:r>
+                        <a:rPr cap="none" sz="1200" i="0" b="0" u="none">
+                          <a:solidFill>
+                            <a:srgbClr val="000000">
+                              <a:alpha val="100000"/>
+                            </a:srgbClr>
+                          </a:solidFill>
+                          <a:latin typeface="arial"/>
+                          <a:cs typeface="arial"/>
+                          <a:ea typeface="arial"/>
+                          <a:sym typeface="arial"/>
+                        </a:rPr>
+                        <a:t/>
+                      </a:r>
+                    </a:p>
+                  </a:txBody>
+                  <a:tcPr anchor="ctr" marB="38100" marT="38100" marR="0" marL="0">
+                    <a:lnL algn="ctr" cmpd="sng" cap="flat" w="0">
+                      <a:noFill/>
+                      <a:prstDash val="solid"/>
+                    </a:lnL>
+                    <a:lnR algn="ctr" cmpd="sng" cap="flat" w="0">
+                      <a:noFill/>
+                      <a:prstDash val="solid"/>
+                    </a:lnR>
+                    <a:lnT algn="ctr" cmpd="sng" cap="flat" w="0">
+                      <a:noFill/>
+                      <a:prstDash val="solid"/>
+                    </a:lnT>
+                    <a:lnB algn="ctr" cmpd="sng" cap="flat" w="0">
+                      <a:noFill/>
+                      <a:prstDash val="solid"/>
+                    </a:lnB>
+                    <a:solidFill>
+                      <a:srgbClr val="FF7D29">
+                        <a:alpha val="100000"/>
+                      </a:srgbClr>
+                    </a:solidFill>
+                  </a:tcPr>
+                </a:tc>
+                <a:tc>
+                  <a:txBody>
+                    <a:bodyPr/>
+                    <a:lstStyle/>
+                    <a:p>
+                      <a:pPr algn="ctr" marL="63500" marR="63500">
+                        <a:lnSpc>
+                          <a:spcPct val="100000"/>
+                        </a:lnSpc>
+                        <a:spcBef>
+                          <a:spcPts val="300"/>
+                        </a:spcBef>
+                        <a:spcAft>
+                          <a:spcPts val="300"/>
+                        </a:spcAft>
+                        <a:buNone/>
+                      </a:pPr>
+                      <a:endParaRPr cap="none" sz="1200" i="0" b="0" u="none">
+                        <a:solidFill>
+                          <a:srgbClr val="000000">
+                            <a:alpha val="100000"/>
+                          </a:srgbClr>
+                        </a:solidFill>
+                        <a:latin typeface="arial"/>
+                        <a:cs typeface="arial"/>
+                        <a:ea typeface="arial"/>
+                        <a:sym typeface="arial"/>
+                      </a:endParaRPr>
+                      <a:r>
+                        <a:rPr cap="none" sz="1200" i="0" b="0" u="none">
+                          <a:solidFill>
+                            <a:srgbClr val="000000">
+                              <a:alpha val="100000"/>
+                            </a:srgbClr>
+                          </a:solidFill>
+                          <a:latin typeface="arial"/>
+                          <a:cs typeface="arial"/>
+                          <a:ea typeface="arial"/>
+                          <a:sym typeface="arial"/>
+                        </a:rPr>
+                        <a:t/>
+                      </a:r>
+                    </a:p>
+                  </a:txBody>
+                  <a:tcPr anchor="ctr" marB="38100" marT="38100" marR="0" marL="0">
+                    <a:lnL algn="ctr" cmpd="sng" cap="flat" w="0">
+                      <a:noFill/>
+                      <a:prstDash val="solid"/>
+                    </a:lnL>
+                    <a:lnR algn="ctr" cmpd="sng" cap="flat" w="0">
+                      <a:noFill/>
+                      <a:prstDash val="solid"/>
+                    </a:lnR>
+                    <a:lnT algn="ctr" cmpd="sng" cap="flat" w="0">
+                      <a:noFill/>
+                      <a:prstDash val="solid"/>
+                    </a:lnT>
+                    <a:lnB algn="ctr" cmpd="sng" cap="flat" w="0">
+                      <a:noFill/>
+                      <a:prstDash val="solid"/>
+                    </a:lnB>
+                    <a:solidFill>
+                      <a:srgbClr val="FF7D29">
+                        <a:alpha val="100000"/>
+                      </a:srgbClr>
+                    </a:solidFill>
+                  </a:tcPr>
+                </a:tc>
+                <a:tc>
+                  <a:txBody>
+                    <a:bodyPr/>
+                    <a:lstStyle/>
+                    <a:p>
+                      <a:pPr algn="ctr" marL="63500" marR="63500">
+                        <a:lnSpc>
+                          <a:spcPct val="100000"/>
+                        </a:lnSpc>
+                        <a:spcBef>
+                          <a:spcPts val="300"/>
+                        </a:spcBef>
+                        <a:spcAft>
+                          <a:spcPts val="300"/>
+                        </a:spcAft>
+                        <a:buNone/>
+                      </a:pPr>
+                      <a:endParaRPr cap="none" sz="1200" i="0" b="0" u="none">
+                        <a:solidFill>
+                          <a:srgbClr val="000000">
+                            <a:alpha val="100000"/>
+                          </a:srgbClr>
+                        </a:solidFill>
+                        <a:latin typeface="arial"/>
+                        <a:cs typeface="arial"/>
+                        <a:ea typeface="arial"/>
+                        <a:sym typeface="arial"/>
+                      </a:endParaRPr>
+                      <a:r>
+                        <a:rPr cap="none" sz="1200" i="0" b="0" u="none">
+                          <a:solidFill>
+                            <a:srgbClr val="000000">
+                              <a:alpha val="100000"/>
+                            </a:srgbClr>
+                          </a:solidFill>
+                          <a:latin typeface="arial"/>
+                          <a:cs typeface="arial"/>
+                          <a:ea typeface="arial"/>
+                          <a:sym typeface="arial"/>
+                        </a:rPr>
+                        <a:t/>
+                      </a:r>
+                    </a:p>
+                  </a:txBody>
+                  <a:tcPr anchor="ctr" marB="38100" marT="38100" marR="0" marL="0">
+                    <a:lnL algn="ctr" cmpd="sng" cap="flat" w="0">
+                      <a:noFill/>
+                      <a:prstDash val="solid"/>
+                    </a:lnL>
+                    <a:lnR algn="ctr" cmpd="sng" cap="flat" w="0">
+                      <a:noFill/>
+                      <a:prstDash val="solid"/>
+                    </a:lnR>
+                    <a:lnT algn="ctr" cmpd="sng" cap="flat" w="0">
+                      <a:noFill/>
+                      <a:prstDash val="solid"/>
+                    </a:lnT>
+                    <a:lnB algn="ctr" cmpd="sng" cap="flat" w="0">
+                      <a:noFill/>
+                      <a:prstDash val="solid"/>
+                    </a:lnB>
+                    <a:solidFill>
+                      <a:srgbClr val="FF7D29">
+                        <a:alpha val="100000"/>
+                      </a:srgbClr>
+                    </a:solidFill>
+                  </a:tcPr>
+                </a:tc>
+                <a:tc>
+                  <a:txBody>
+                    <a:bodyPr/>
+                    <a:lstStyle/>
+                    <a:p>
+                      <a:pPr algn="ctr" marL="63500" marR="63500">
+                        <a:lnSpc>
+                          <a:spcPct val="100000"/>
+                        </a:lnSpc>
+                        <a:spcBef>
+                          <a:spcPts val="300"/>
+                        </a:spcBef>
+                        <a:spcAft>
+                          <a:spcPts val="300"/>
+                        </a:spcAft>
+                        <a:buNone/>
+                      </a:pPr>
+                      <a:endParaRPr cap="none" sz="1200" i="0" b="0" u="none">
+                        <a:solidFill>
+                          <a:srgbClr val="000000">
+                            <a:alpha val="100000"/>
+                          </a:srgbClr>
+                        </a:solidFill>
+                        <a:latin typeface="arial"/>
+                        <a:cs typeface="arial"/>
+                        <a:ea typeface="arial"/>
+                        <a:sym typeface="arial"/>
+                      </a:endParaRPr>
+                      <a:r>
+                        <a:rPr cap="none" sz="1200" i="0" b="0" u="none">
+                          <a:solidFill>
+                            <a:srgbClr val="000000">
+                              <a:alpha val="100000"/>
+                            </a:srgbClr>
+                          </a:solidFill>
+                          <a:latin typeface="arial"/>
+                          <a:cs typeface="arial"/>
+                          <a:ea typeface="arial"/>
+                          <a:sym typeface="arial"/>
+                        </a:rPr>
+                        <a:t/>
+                      </a:r>
+                    </a:p>
+                  </a:txBody>
+                  <a:tcPr anchor="ctr" marB="38100" marT="38100" marR="0" marL="0">
+                    <a:lnL algn="ctr" cmpd="sng" cap="flat" w="0">
+                      <a:noFill/>
+                      <a:prstDash val="solid"/>
+                    </a:lnL>
+                    <a:lnR algn="ctr" cmpd="sng" cap="flat" w="0">
+                      <a:noFill/>
+                      <a:prstDash val="solid"/>
+                    </a:lnR>
+                    <a:lnT algn="ctr" cmpd="sng" cap="flat" w="0">
+                      <a:noFill/>
+                      <a:prstDash val="solid"/>
+                    </a:lnT>
+                    <a:lnB algn="ctr" cmpd="sng" cap="flat" w="0">
+                      <a:noFill/>
+                      <a:prstDash val="solid"/>
+                    </a:lnB>
+                    <a:solidFill>
+                      <a:srgbClr val="FF7D29">
+                        <a:alpha val="100000"/>
+                      </a:srgbClr>
+                    </a:solidFill>
+                  </a:tcPr>
+                </a:tc>
+              </a:tr>
+              <a:tr h="243582">
+                <a:tc>
+                  <a:txBody>
+                    <a:bodyPr/>
+                    <a:lstStyle/>
+                    <a:p>
+                      <a:pPr algn="l" marL="127000" marR="63500">
+                        <a:lnSpc>
+                          <a:spcPct val="100000"/>
+                        </a:lnSpc>
+                        <a:spcBef>
+                          <a:spcPts val="300"/>
+                        </a:spcBef>
+                        <a:spcAft>
+                          <a:spcPts val="300"/>
+                        </a:spcAft>
+                        <a:buNone/>
+                      </a:pPr>
+                      <a:r>
+                        <a:rPr cap="none" sz="1200" i="0" b="0" u="none">
+                          <a:solidFill>
+                            <a:srgbClr val="000000">
+                              <a:alpha val="100000"/>
+                            </a:srgbClr>
+                          </a:solidFill>
+                          <a:latin typeface="arial"/>
+                          <a:cs typeface="arial"/>
+                          <a:ea typeface="arial"/>
+                          <a:sym typeface="arial"/>
+                        </a:rPr>
+                        <a:t>F</a:t>
+                      </a:r>
+                    </a:p>
+                  </a:txBody>
+                  <a:tcPr anchor="ctr" marB="38100" marT="38100" marR="0" marL="0">
+                    <a:lnL algn="ctr" cmpd="sng" cap="flat" w="0">
+                      <a:noFill/>
+                      <a:prstDash val="solid"/>
+                    </a:lnL>
+                    <a:lnR algn="ctr" cmpd="sng" cap="flat" w="0">
+                      <a:noFill/>
+                      <a:prstDash val="solid"/>
+                    </a:lnR>
+                    <a:lnT algn="ctr" cmpd="sng" cap="flat" w="0">
+                      <a:noFill/>
+                      <a:prstDash val="solid"/>
+                    </a:lnT>
+                    <a:lnB algn="ctr" cmpd="sng" cap="flat" w="0">
+                      <a:noFill/>
+                      <a:prstDash val="solid"/>
+                    </a:lnB>
+                    <a:solidFill>
+                      <a:srgbClr val="FFBD69">
+                        <a:alpha val="100000"/>
+                      </a:srgbClr>
+                    </a:solidFill>
+                  </a:tcPr>
+                </a:tc>
+                <a:tc>
+                  <a:txBody>
+                    <a:bodyPr/>
+                    <a:lstStyle/>
+                    <a:p>
+                      <a:pPr algn="ctr" marL="63500" marR="63500">
+                        <a:lnSpc>
+                          <a:spcPct val="100000"/>
+                        </a:lnSpc>
+                        <a:spcBef>
+                          <a:spcPts val="300"/>
+                        </a:spcBef>
+                        <a:spcAft>
+                          <a:spcPts val="300"/>
+                        </a:spcAft>
+                        <a:buNone/>
+                      </a:pPr>
+                      <a:r>
+                        <a:rPr cap="none" sz="1200" i="0" b="0" u="none">
+                          <a:solidFill>
+                            <a:srgbClr val="000000">
+                              <a:alpha val="100000"/>
+                            </a:srgbClr>
+                          </a:solidFill>
+                          <a:latin typeface="arial"/>
+                          <a:cs typeface="arial"/>
+                          <a:ea typeface="arial"/>
+                          <a:sym typeface="arial"/>
+                        </a:rPr>
+                        <a:t>79 (59%)</a:t>
+                      </a:r>
+                    </a:p>
+                  </a:txBody>
+                  <a:tcPr anchor="ctr" marB="38100" marT="38100" marR="0" marL="0">
+                    <a:lnL algn="ctr" cmpd="sng" cap="flat" w="0">
+                      <a:noFill/>
+                      <a:prstDash val="solid"/>
+                    </a:lnL>
+                    <a:lnR algn="ctr" cmpd="sng" cap="flat" w="0">
+                      <a:noFill/>
+                      <a:prstDash val="solid"/>
+                    </a:lnR>
+                    <a:lnT algn="ctr" cmpd="sng" cap="flat" w="0">
+                      <a:noFill/>
+                      <a:prstDash val="solid"/>
+                    </a:lnT>
+                    <a:lnB algn="ctr" cmpd="sng" cap="flat" w="0">
+                      <a:noFill/>
+                      <a:prstDash val="solid"/>
+                    </a:lnB>
+                    <a:solidFill>
+                      <a:srgbClr val="FFBD69">
+                        <a:alpha val="100000"/>
+                      </a:srgbClr>
+                    </a:solidFill>
+                  </a:tcPr>
+                </a:tc>
+                <a:tc>
+                  <a:txBody>
+                    <a:bodyPr/>
+                    <a:lstStyle/>
+                    <a:p>
+                      <a:pPr algn="ctr" marL="63500" marR="63500">
+                        <a:lnSpc>
+                          <a:spcPct val="100000"/>
+                        </a:lnSpc>
+                        <a:spcBef>
+                          <a:spcPts val="300"/>
+                        </a:spcBef>
+                        <a:spcAft>
+                          <a:spcPts val="300"/>
+                        </a:spcAft>
+                        <a:buNone/>
+                      </a:pPr>
+                      <a:r>
+                        <a:rPr cap="none" sz="1200" i="0" b="0" u="none">
+                          <a:solidFill>
+                            <a:srgbClr val="000000">
+                              <a:alpha val="100000"/>
+                            </a:srgbClr>
+                          </a:solidFill>
+                          <a:latin typeface="arial"/>
+                          <a:cs typeface="arial"/>
+                          <a:ea typeface="arial"/>
+                          <a:sym typeface="arial"/>
+                        </a:rPr>
+                        <a:t>82 (61.2%)</a:t>
+                      </a:r>
+                    </a:p>
+                  </a:txBody>
+                  <a:tcPr anchor="ctr" marB="38100" marT="38100" marR="0" marL="0">
+                    <a:lnL algn="ctr" cmpd="sng" cap="flat" w="0">
+                      <a:noFill/>
+                      <a:prstDash val="solid"/>
+                    </a:lnL>
+                    <a:lnR algn="ctr" cmpd="sng" cap="flat" w="0">
+                      <a:noFill/>
+                      <a:prstDash val="solid"/>
+                    </a:lnR>
+                    <a:lnT algn="ctr" cmpd="sng" cap="flat" w="0">
+                      <a:noFill/>
+                      <a:prstDash val="solid"/>
+                    </a:lnT>
+                    <a:lnB algn="ctr" cmpd="sng" cap="flat" w="0">
+                      <a:noFill/>
+                      <a:prstDash val="solid"/>
+                    </a:lnB>
+                    <a:solidFill>
+                      <a:srgbClr val="FFBD69">
+                        <a:alpha val="100000"/>
+                      </a:srgbClr>
+                    </a:solidFill>
+                  </a:tcPr>
+                </a:tc>
+                <a:tc>
+                  <a:txBody>
+                    <a:bodyPr/>
+                    <a:lstStyle/>
+                    <a:p>
+                      <a:pPr algn="ctr" marL="63500" marR="63500">
+                        <a:lnSpc>
+                          <a:spcPct val="100000"/>
+                        </a:lnSpc>
+                        <a:spcBef>
+                          <a:spcPts val="300"/>
+                        </a:spcBef>
+                        <a:spcAft>
+                          <a:spcPts val="300"/>
+                        </a:spcAft>
+                        <a:buNone/>
+                      </a:pPr>
+                      <a:r>
+                        <a:rPr cap="none" sz="1200" i="0" b="0" u="none">
+                          <a:solidFill>
+                            <a:srgbClr val="000000">
+                              <a:alpha val="100000"/>
+                            </a:srgbClr>
+                          </a:solidFill>
+                          <a:latin typeface="arial"/>
+                          <a:cs typeface="arial"/>
+                          <a:ea typeface="arial"/>
+                          <a:sym typeface="arial"/>
+                        </a:rPr>
+                        <a:t>70 (53%)</a:t>
+                      </a:r>
+                    </a:p>
+                  </a:txBody>
+                  <a:tcPr anchor="ctr" marB="38100" marT="38100" marR="0" marL="0">
+                    <a:lnL algn="ctr" cmpd="sng" cap="flat" w="0">
+                      <a:noFill/>
+                      <a:prstDash val="solid"/>
+                    </a:lnL>
+                    <a:lnR algn="ctr" cmpd="sng" cap="flat" w="0">
+                      <a:noFill/>
+                      <a:prstDash val="solid"/>
+                    </a:lnR>
+                    <a:lnT algn="ctr" cmpd="sng" cap="flat" w="0">
+                      <a:noFill/>
+                      <a:prstDash val="solid"/>
+                    </a:lnT>
+                    <a:lnB algn="ctr" cmpd="sng" cap="flat" w="0">
+                      <a:noFill/>
+                      <a:prstDash val="solid"/>
+                    </a:lnB>
+                    <a:solidFill>
+                      <a:srgbClr val="FFBD69">
+                        <a:alpha val="100000"/>
+                      </a:srgbClr>
+                    </a:solidFill>
+                  </a:tcPr>
+                </a:tc>
+                <a:tc>
+                  <a:txBody>
+                    <a:bodyPr/>
+                    <a:lstStyle/>
+                    <a:p>
+                      <a:pPr algn="ctr" marL="63500" marR="63500">
+                        <a:lnSpc>
+                          <a:spcPct val="100000"/>
+                        </a:lnSpc>
+                        <a:spcBef>
+                          <a:spcPts val="300"/>
+                        </a:spcBef>
+                        <a:spcAft>
+                          <a:spcPts val="300"/>
+                        </a:spcAft>
+                        <a:buNone/>
+                      </a:pPr>
+                      <a:r>
+                        <a:rPr cap="none" sz="1200" i="0" b="0" u="none">
+                          <a:solidFill>
+                            <a:srgbClr val="000000">
+                              <a:alpha val="100000"/>
+                            </a:srgbClr>
+                          </a:solidFill>
+                          <a:latin typeface="arial"/>
+                          <a:cs typeface="arial"/>
+                          <a:ea typeface="arial"/>
+                          <a:sym typeface="arial"/>
+                        </a:rPr>
+                        <a:t>231 (57.8%)</a:t>
+                      </a:r>
+                    </a:p>
+                  </a:txBody>
+                  <a:tcPr anchor="ctr" marB="38100" marT="38100" marR="0" marL="0">
+                    <a:lnL algn="ctr" cmpd="sng" cap="flat" w="0">
+                      <a:noFill/>
+                      <a:prstDash val="solid"/>
+                    </a:lnL>
+                    <a:lnR algn="ctr" cmpd="sng" cap="flat" w="0">
+                      <a:noFill/>
+                      <a:prstDash val="solid"/>
+                    </a:lnR>
+                    <a:lnT algn="ctr" cmpd="sng" cap="flat" w="0">
+                      <a:noFill/>
+                      <a:prstDash val="solid"/>
+                    </a:lnT>
+                    <a:lnB algn="ctr" cmpd="sng" cap="flat" w="0">
+                      <a:noFill/>
+                      <a:prstDash val="solid"/>
+                    </a:lnB>
+                    <a:solidFill>
+                      <a:srgbClr val="FFBD69">
+                        <a:alpha val="100000"/>
+                      </a:srgbClr>
+                    </a:solidFill>
+                  </a:tcPr>
+                </a:tc>
+              </a:tr>
+              <a:tr h="243582">
+                <a:tc>
+                  <a:txBody>
+                    <a:bodyPr/>
+                    <a:lstStyle/>
+                    <a:p>
+                      <a:pPr algn="l" marL="127000" marR="63500">
+                        <a:lnSpc>
+                          <a:spcPct val="100000"/>
+                        </a:lnSpc>
+                        <a:spcBef>
+                          <a:spcPts val="300"/>
+                        </a:spcBef>
+                        <a:spcAft>
+                          <a:spcPts val="300"/>
+                        </a:spcAft>
+                        <a:buNone/>
+                      </a:pPr>
+                      <a:r>
+                        <a:rPr cap="none" sz="1200" i="0" b="0" u="none">
+                          <a:solidFill>
+                            <a:srgbClr val="000000">
+                              <a:alpha val="100000"/>
+                            </a:srgbClr>
+                          </a:solidFill>
+                          <a:latin typeface="arial"/>
+                          <a:cs typeface="arial"/>
+                          <a:ea typeface="arial"/>
+                          <a:sym typeface="arial"/>
+                        </a:rPr>
+                        <a:t>M</a:t>
+                      </a:r>
+                    </a:p>
+                  </a:txBody>
+                  <a:tcPr anchor="ctr" marB="38100" marT="38100" marR="0" marL="0">
+                    <a:lnL algn="ctr" cmpd="sng" cap="flat" w="0">
+                      <a:noFill/>
+                      <a:prstDash val="solid"/>
+                    </a:lnL>
+                    <a:lnR algn="ctr" cmpd="sng" cap="flat" w="0">
+                      <a:noFill/>
+                      <a:prstDash val="solid"/>
+                    </a:lnR>
+                    <a:lnT algn="ctr" cmpd="sng" cap="flat" w="0">
+                      <a:noFill/>
+                      <a:prstDash val="solid"/>
+                    </a:lnT>
+                    <a:lnB algn="ctr" cmpd="sng" cap="flat" w="0">
+                      <a:noFill/>
+                      <a:prstDash val="solid"/>
+                    </a:lnB>
+                    <a:solidFill>
+                      <a:srgbClr val="FF7D29">
+                        <a:alpha val="100000"/>
+                      </a:srgbClr>
+                    </a:solidFill>
+                  </a:tcPr>
+                </a:tc>
+                <a:tc>
+                  <a:txBody>
+                    <a:bodyPr/>
+                    <a:lstStyle/>
+                    <a:p>
+                      <a:pPr algn="ctr" marL="63500" marR="63500">
+                        <a:lnSpc>
+                          <a:spcPct val="100000"/>
+                        </a:lnSpc>
+                        <a:spcBef>
+                          <a:spcPts val="300"/>
+                        </a:spcBef>
+                        <a:spcAft>
+                          <a:spcPts val="300"/>
+                        </a:spcAft>
+                        <a:buNone/>
+                      </a:pPr>
+                      <a:r>
+                        <a:rPr cap="none" sz="1200" i="0" b="0" u="none">
+                          <a:solidFill>
+                            <a:srgbClr val="000000">
+                              <a:alpha val="100000"/>
+                            </a:srgbClr>
+                          </a:solidFill>
+                          <a:latin typeface="arial"/>
+                          <a:cs typeface="arial"/>
+                          <a:ea typeface="arial"/>
+                          <a:sym typeface="arial"/>
+                        </a:rPr>
+                        <a:t>55 (41%)</a:t>
+                      </a:r>
+                    </a:p>
+                  </a:txBody>
+                  <a:tcPr anchor="ctr" marB="38100" marT="38100" marR="0" marL="0">
+                    <a:lnL algn="ctr" cmpd="sng" cap="flat" w="0">
+                      <a:noFill/>
+                      <a:prstDash val="solid"/>
+                    </a:lnL>
+                    <a:lnR algn="ctr" cmpd="sng" cap="flat" w="0">
+                      <a:noFill/>
+                      <a:prstDash val="solid"/>
+                    </a:lnR>
+                    <a:lnT algn="ctr" cmpd="sng" cap="flat" w="0">
+                      <a:noFill/>
+                      <a:prstDash val="solid"/>
+                    </a:lnT>
+                    <a:lnB algn="ctr" cmpd="sng" cap="flat" w="0">
+                      <a:noFill/>
+                      <a:prstDash val="solid"/>
+                    </a:lnB>
+                    <a:solidFill>
+                      <a:srgbClr val="FF7D29">
+                        <a:alpha val="100000"/>
+                      </a:srgbClr>
+                    </a:solidFill>
+                  </a:tcPr>
+                </a:tc>
+                <a:tc>
+                  <a:txBody>
+                    <a:bodyPr/>
+                    <a:lstStyle/>
+                    <a:p>
+                      <a:pPr algn="ctr" marL="63500" marR="63500">
+                        <a:lnSpc>
+                          <a:spcPct val="100000"/>
+                        </a:lnSpc>
+                        <a:spcBef>
+                          <a:spcPts val="300"/>
+                        </a:spcBef>
+                        <a:spcAft>
+                          <a:spcPts val="300"/>
+                        </a:spcAft>
+                        <a:buNone/>
+                      </a:pPr>
+                      <a:r>
+                        <a:rPr cap="none" sz="1200" i="0" b="0" u="none">
+                          <a:solidFill>
+                            <a:srgbClr val="000000">
+                              <a:alpha val="100000"/>
+                            </a:srgbClr>
+                          </a:solidFill>
+                          <a:latin typeface="arial"/>
+                          <a:cs typeface="arial"/>
+                          <a:ea typeface="arial"/>
+                          <a:sym typeface="arial"/>
+                        </a:rPr>
+                        <a:t>52 (38.8%)</a:t>
+                      </a:r>
+                    </a:p>
+                  </a:txBody>
+                  <a:tcPr anchor="ctr" marB="38100" marT="38100" marR="0" marL="0">
+                    <a:lnL algn="ctr" cmpd="sng" cap="flat" w="0">
+                      <a:noFill/>
+                      <a:prstDash val="solid"/>
+                    </a:lnL>
+                    <a:lnR algn="ctr" cmpd="sng" cap="flat" w="0">
+                      <a:noFill/>
+                      <a:prstDash val="solid"/>
+                    </a:lnR>
+                    <a:lnT algn="ctr" cmpd="sng" cap="flat" w="0">
+                      <a:noFill/>
+                      <a:prstDash val="solid"/>
+                    </a:lnT>
+                    <a:lnB algn="ctr" cmpd="sng" cap="flat" w="0">
+                      <a:noFill/>
+                      <a:prstDash val="solid"/>
+                    </a:lnB>
+                    <a:solidFill>
+                      <a:srgbClr val="FF7D29">
+                        <a:alpha val="100000"/>
+                      </a:srgbClr>
+                    </a:solidFill>
+                  </a:tcPr>
+                </a:tc>
+                <a:tc>
+                  <a:txBody>
+                    <a:bodyPr/>
+                    <a:lstStyle/>
+                    <a:p>
+                      <a:pPr algn="ctr" marL="63500" marR="63500">
+                        <a:lnSpc>
+                          <a:spcPct val="100000"/>
+                        </a:lnSpc>
+                        <a:spcBef>
+                          <a:spcPts val="300"/>
+                        </a:spcBef>
+                        <a:spcAft>
+                          <a:spcPts val="300"/>
+                        </a:spcAft>
+                        <a:buNone/>
+                      </a:pPr>
+                      <a:r>
+                        <a:rPr cap="none" sz="1200" i="0" b="0" u="none">
+                          <a:solidFill>
+                            <a:srgbClr val="000000">
+                              <a:alpha val="100000"/>
+                            </a:srgbClr>
+                          </a:solidFill>
+                          <a:latin typeface="arial"/>
+                          <a:cs typeface="arial"/>
+                          <a:ea typeface="arial"/>
+                          <a:sym typeface="arial"/>
+                        </a:rPr>
+                        <a:t>62 (47%)</a:t>
+                      </a:r>
+                    </a:p>
+                  </a:txBody>
+                  <a:tcPr anchor="ctr" marB="38100" marT="38100" marR="0" marL="0">
+                    <a:lnL algn="ctr" cmpd="sng" cap="flat" w="0">
+                      <a:noFill/>
+                      <a:prstDash val="solid"/>
+                    </a:lnL>
+                    <a:lnR algn="ctr" cmpd="sng" cap="flat" w="0">
+                      <a:noFill/>
+                      <a:prstDash val="solid"/>
+                    </a:lnR>
+                    <a:lnT algn="ctr" cmpd="sng" cap="flat" w="0">
+                      <a:noFill/>
+                      <a:prstDash val="solid"/>
+                    </a:lnT>
+                    <a:lnB algn="ctr" cmpd="sng" cap="flat" w="0">
+                      <a:noFill/>
+                      <a:prstDash val="solid"/>
+                    </a:lnB>
+                    <a:solidFill>
+                      <a:srgbClr val="FF7D29">
+                        <a:alpha val="100000"/>
+                      </a:srgbClr>
+                    </a:solidFill>
+                  </a:tcPr>
+                </a:tc>
+                <a:tc>
+                  <a:txBody>
+                    <a:bodyPr/>
+                    <a:lstStyle/>
+                    <a:p>
+                      <a:pPr algn="ctr" marL="63500" marR="63500">
+                        <a:lnSpc>
+                          <a:spcPct val="100000"/>
+                        </a:lnSpc>
+                        <a:spcBef>
+                          <a:spcPts val="300"/>
+                        </a:spcBef>
+                        <a:spcAft>
+                          <a:spcPts val="300"/>
+                        </a:spcAft>
+                        <a:buNone/>
+                      </a:pPr>
+                      <a:r>
+                        <a:rPr cap="none" sz="1200" i="0" b="0" u="none">
+                          <a:solidFill>
+                            <a:srgbClr val="000000">
+                              <a:alpha val="100000"/>
+                            </a:srgbClr>
+                          </a:solidFill>
+                          <a:latin typeface="arial"/>
+                          <a:cs typeface="arial"/>
+                          <a:ea typeface="arial"/>
+                          <a:sym typeface="arial"/>
+                        </a:rPr>
+                        <a:t>169 (42.2%)</a:t>
+                      </a:r>
+                    </a:p>
+                  </a:txBody>
+                  <a:tcPr anchor="ctr" marB="38100" marT="38100" marR="0" marL="0">
+                    <a:lnL algn="ctr" cmpd="sng" cap="flat" w="0">
+                      <a:noFill/>
+                      <a:prstDash val="solid"/>
+                    </a:lnL>
+                    <a:lnR algn="ctr" cmpd="sng" cap="flat" w="0">
+                      <a:noFill/>
+                      <a:prstDash val="solid"/>
+                    </a:lnR>
+                    <a:lnT algn="ctr" cmpd="sng" cap="flat" w="0">
+                      <a:noFill/>
+                      <a:prstDash val="solid"/>
+                    </a:lnT>
+                    <a:lnB algn="ctr" cmpd="sng" cap="flat" w="0">
+                      <a:noFill/>
+                      <a:prstDash val="solid"/>
+                    </a:lnB>
+                    <a:solidFill>
+                      <a:srgbClr val="FF7D29">
+                        <a:alpha val="100000"/>
+                      </a:srgbClr>
+                    </a:solidFill>
+                  </a:tcPr>
+                </a:tc>
+              </a:tr>
+              <a:tr h="238075">
+                <a:tc>
+                  <a:txBody>
+                    <a:bodyPr/>
+                    <a:lstStyle/>
+                    <a:p>
+                      <a:pPr algn="l" marL="127000" marR="63500">
+                        <a:lnSpc>
+                          <a:spcPct val="100000"/>
+                        </a:lnSpc>
+                        <a:spcBef>
+                          <a:spcPts val="300"/>
+                        </a:spcBef>
+                        <a:spcAft>
+                          <a:spcPts val="300"/>
+                        </a:spcAft>
+                        <a:buNone/>
+                      </a:pPr>
+                      <a:r>
+                        <a:rPr cap="none" sz="1200" i="0" b="0" u="none">
+                          <a:solidFill>
+                            <a:srgbClr val="000000">
+                              <a:alpha val="100000"/>
+                            </a:srgbClr>
+                          </a:solidFill>
+                          <a:latin typeface="arial"/>
+                          <a:cs typeface="arial"/>
+                          <a:ea typeface="arial"/>
+                          <a:sym typeface="arial"/>
+                        </a:rPr>
+                        <a:t>Age</a:t>
+                      </a:r>
+                    </a:p>
+                  </a:txBody>
+                  <a:tcPr anchor="ctr" marB="38100" marT="38100" marR="0" marL="0">
+                    <a:lnL algn="ctr" cmpd="sng" cap="flat" w="0">
+                      <a:noFill/>
+                      <a:prstDash val="solid"/>
+                    </a:lnL>
+                    <a:lnR algn="ctr" cmpd="sng" cap="flat" w="0">
+                      <a:noFill/>
+                      <a:prstDash val="solid"/>
+                    </a:lnR>
+                    <a:lnT algn="ctr" cmpd="sng" cap="flat" w="0">
+                      <a:noFill/>
+                      <a:prstDash val="solid"/>
+                    </a:lnT>
+                    <a:lnB algn="ctr" cmpd="sng" cap="flat" w="0">
+                      <a:noFill/>
+                      <a:prstDash val="solid"/>
+                    </a:lnB>
+                    <a:solidFill>
+                      <a:srgbClr val="FFBD69">
+                        <a:alpha val="100000"/>
+                      </a:srgbClr>
+                    </a:solidFill>
+                  </a:tcPr>
+                </a:tc>
+                <a:tc>
+                  <a:txBody>
+                    <a:bodyPr/>
+                    <a:lstStyle/>
+                    <a:p>
+                      <a:pPr algn="ctr" marL="63500" marR="63500">
+                        <a:lnSpc>
+                          <a:spcPct val="100000"/>
+                        </a:lnSpc>
+                        <a:spcBef>
+                          <a:spcPts val="300"/>
+                        </a:spcBef>
+                        <a:spcAft>
+                          <a:spcPts val="300"/>
+                        </a:spcAft>
+                        <a:buNone/>
+                      </a:pPr>
+                      <a:endParaRPr cap="none" sz="1200" i="0" b="0" u="none">
+                        <a:solidFill>
+                          <a:srgbClr val="000000">
+                            <a:alpha val="100000"/>
+                          </a:srgbClr>
+                        </a:solidFill>
+                        <a:latin typeface="arial"/>
+                        <a:cs typeface="arial"/>
+                        <a:ea typeface="arial"/>
+                        <a:sym typeface="arial"/>
+                      </a:endParaRPr>
+                      <a:r>
+                        <a:rPr cap="none" sz="1200" i="0" b="0" u="none">
+                          <a:solidFill>
+                            <a:srgbClr val="000000">
+                              <a:alpha val="100000"/>
+                            </a:srgbClr>
+                          </a:solidFill>
+                          <a:latin typeface="arial"/>
+                          <a:cs typeface="arial"/>
+                          <a:ea typeface="arial"/>
+                          <a:sym typeface="arial"/>
+                        </a:rPr>
+                        <a:t/>
+                      </a:r>
+                    </a:p>
+                  </a:txBody>
+                  <a:tcPr anchor="ctr" marB="38100" marT="38100" marR="0" marL="0">
+                    <a:lnL algn="ctr" cmpd="sng" cap="flat" w="0">
+                      <a:noFill/>
+                      <a:prstDash val="solid"/>
+                    </a:lnL>
+                    <a:lnR algn="ctr" cmpd="sng" cap="flat" w="0">
+                      <a:noFill/>
+                      <a:prstDash val="solid"/>
+                    </a:lnR>
+                    <a:lnT algn="ctr" cmpd="sng" cap="flat" w="0">
+                      <a:noFill/>
+                      <a:prstDash val="solid"/>
+                    </a:lnT>
+                    <a:lnB algn="ctr" cmpd="sng" cap="flat" w="0">
+                      <a:noFill/>
+                      <a:prstDash val="solid"/>
+                    </a:lnB>
+                    <a:solidFill>
+                      <a:srgbClr val="FFBD69">
+                        <a:alpha val="100000"/>
+                      </a:srgbClr>
+                    </a:solidFill>
+                  </a:tcPr>
+                </a:tc>
+                <a:tc>
+                  <a:txBody>
+                    <a:bodyPr/>
+                    <a:lstStyle/>
+                    <a:p>
+                      <a:pPr algn="ctr" marL="63500" marR="63500">
+                        <a:lnSpc>
+                          <a:spcPct val="100000"/>
+                        </a:lnSpc>
+                        <a:spcBef>
+                          <a:spcPts val="300"/>
+                        </a:spcBef>
+                        <a:spcAft>
+                          <a:spcPts val="300"/>
+                        </a:spcAft>
+                        <a:buNone/>
+                      </a:pPr>
+                      <a:endParaRPr cap="none" sz="1200" i="0" b="0" u="none">
+                        <a:solidFill>
+                          <a:srgbClr val="000000">
+                            <a:alpha val="100000"/>
+                          </a:srgbClr>
+                        </a:solidFill>
+                        <a:latin typeface="arial"/>
+                        <a:cs typeface="arial"/>
+                        <a:ea typeface="arial"/>
+                        <a:sym typeface="arial"/>
+                      </a:endParaRPr>
+                      <a:r>
+                        <a:rPr cap="none" sz="1200" i="0" b="0" u="none">
+                          <a:solidFill>
+                            <a:srgbClr val="000000">
+                              <a:alpha val="100000"/>
+                            </a:srgbClr>
+                          </a:solidFill>
+                          <a:latin typeface="arial"/>
+                          <a:cs typeface="arial"/>
+                          <a:ea typeface="arial"/>
+                          <a:sym typeface="arial"/>
+                        </a:rPr>
+                        <a:t/>
+                      </a:r>
+                    </a:p>
+                  </a:txBody>
+                  <a:tcPr anchor="ctr" marB="38100" marT="38100" marR="0" marL="0">
+                    <a:lnL algn="ctr" cmpd="sng" cap="flat" w="0">
+                      <a:noFill/>
+                      <a:prstDash val="solid"/>
+                    </a:lnL>
+                    <a:lnR algn="ctr" cmpd="sng" cap="flat" w="0">
+                      <a:noFill/>
+                      <a:prstDash val="solid"/>
+                    </a:lnR>
+                    <a:lnT algn="ctr" cmpd="sng" cap="flat" w="0">
+                      <a:noFill/>
+                      <a:prstDash val="solid"/>
+                    </a:lnT>
+                    <a:lnB algn="ctr" cmpd="sng" cap="flat" w="0">
+                      <a:noFill/>
+                      <a:prstDash val="solid"/>
+                    </a:lnB>
+                    <a:solidFill>
+                      <a:srgbClr val="FFBD69">
+                        <a:alpha val="100000"/>
+                      </a:srgbClr>
+                    </a:solidFill>
+                  </a:tcPr>
+                </a:tc>
+                <a:tc>
+                  <a:txBody>
+                    <a:bodyPr/>
+                    <a:lstStyle/>
+                    <a:p>
+                      <a:pPr algn="ctr" marL="63500" marR="63500">
+                        <a:lnSpc>
+                          <a:spcPct val="100000"/>
+                        </a:lnSpc>
+                        <a:spcBef>
+                          <a:spcPts val="300"/>
+                        </a:spcBef>
+                        <a:spcAft>
+                          <a:spcPts val="300"/>
+                        </a:spcAft>
+                        <a:buNone/>
+                      </a:pPr>
+                      <a:endParaRPr cap="none" sz="1200" i="0" b="0" u="none">
+                        <a:solidFill>
+                          <a:srgbClr val="000000">
+                            <a:alpha val="100000"/>
+                          </a:srgbClr>
+                        </a:solidFill>
+                        <a:latin typeface="arial"/>
+                        <a:cs typeface="arial"/>
+                        <a:ea typeface="arial"/>
+                        <a:sym typeface="arial"/>
+                      </a:endParaRPr>
+                      <a:r>
+                        <a:rPr cap="none" sz="1200" i="0" b="0" u="none">
+                          <a:solidFill>
+                            <a:srgbClr val="000000">
+                              <a:alpha val="100000"/>
+                            </a:srgbClr>
+                          </a:solidFill>
+                          <a:latin typeface="arial"/>
+                          <a:cs typeface="arial"/>
+                          <a:ea typeface="arial"/>
+                          <a:sym typeface="arial"/>
+                        </a:rPr>
+                        <a:t/>
+                      </a:r>
+                    </a:p>
+                  </a:txBody>
+                  <a:tcPr anchor="ctr" marB="38100" marT="38100" marR="0" marL="0">
+                    <a:lnL algn="ctr" cmpd="sng" cap="flat" w="0">
+                      <a:noFill/>
+                      <a:prstDash val="solid"/>
+                    </a:lnL>
+                    <a:lnR algn="ctr" cmpd="sng" cap="flat" w="0">
+                      <a:noFill/>
+                      <a:prstDash val="solid"/>
+                    </a:lnR>
+                    <a:lnT algn="ctr" cmpd="sng" cap="flat" w="0">
+                      <a:noFill/>
+                      <a:prstDash val="solid"/>
+                    </a:lnT>
+                    <a:lnB algn="ctr" cmpd="sng" cap="flat" w="0">
+                      <a:noFill/>
+                      <a:prstDash val="solid"/>
+                    </a:lnB>
+                    <a:solidFill>
+                      <a:srgbClr val="FFBD69">
+                        <a:alpha val="100000"/>
+                      </a:srgbClr>
+                    </a:solidFill>
+                  </a:tcPr>
+                </a:tc>
+                <a:tc>
+                  <a:txBody>
+                    <a:bodyPr/>
+                    <a:lstStyle/>
+                    <a:p>
+                      <a:pPr algn="ctr" marL="63500" marR="63500">
+                        <a:lnSpc>
+                          <a:spcPct val="100000"/>
+                        </a:lnSpc>
+                        <a:spcBef>
+                          <a:spcPts val="300"/>
+                        </a:spcBef>
+                        <a:spcAft>
+                          <a:spcPts val="300"/>
+                        </a:spcAft>
+                        <a:buNone/>
+                      </a:pPr>
+                      <a:endParaRPr cap="none" sz="1200" i="0" b="0" u="none">
+                        <a:solidFill>
+                          <a:srgbClr val="000000">
+                            <a:alpha val="100000"/>
+                          </a:srgbClr>
+                        </a:solidFill>
+                        <a:latin typeface="arial"/>
+                        <a:cs typeface="arial"/>
+                        <a:ea typeface="arial"/>
+                        <a:sym typeface="arial"/>
+                      </a:endParaRPr>
+                      <a:r>
+                        <a:rPr cap="none" sz="1200" i="0" b="0" u="none">
+                          <a:solidFill>
+                            <a:srgbClr val="000000">
+                              <a:alpha val="100000"/>
+                            </a:srgbClr>
+                          </a:solidFill>
+                          <a:latin typeface="arial"/>
+                          <a:cs typeface="arial"/>
+                          <a:ea typeface="arial"/>
+                          <a:sym typeface="arial"/>
+                        </a:rPr>
+                        <a:t/>
+                      </a:r>
+                    </a:p>
+                  </a:txBody>
+                  <a:tcPr anchor="ctr" marB="38100" marT="38100" marR="0" marL="0">
+                    <a:lnL algn="ctr" cmpd="sng" cap="flat" w="0">
+                      <a:noFill/>
+                      <a:prstDash val="solid"/>
+                    </a:lnL>
+                    <a:lnR algn="ctr" cmpd="sng" cap="flat" w="0">
+                      <a:noFill/>
+                      <a:prstDash val="solid"/>
+                    </a:lnR>
+                    <a:lnT algn="ctr" cmpd="sng" cap="flat" w="0">
+                      <a:noFill/>
+                      <a:prstDash val="solid"/>
+                    </a:lnT>
+                    <a:lnB algn="ctr" cmpd="sng" cap="flat" w="0">
+                      <a:noFill/>
+                      <a:prstDash val="solid"/>
+                    </a:lnB>
+                    <a:solidFill>
+                      <a:srgbClr val="FFBD69">
+                        <a:alpha val="100000"/>
+                      </a:srgbClr>
+                    </a:solidFill>
+                  </a:tcPr>
+                </a:tc>
+              </a:tr>
+              <a:tr h="213519">
+                <a:tc>
+                  <a:txBody>
+                    <a:bodyPr/>
+                    <a:lstStyle/>
+                    <a:p>
+                      <a:pPr algn="l" marL="127000" marR="63500">
+                        <a:lnSpc>
+                          <a:spcPct val="100000"/>
+                        </a:lnSpc>
+                        <a:spcBef>
+                          <a:spcPts val="300"/>
+                        </a:spcBef>
+                        <a:spcAft>
+                          <a:spcPts val="300"/>
+                        </a:spcAft>
+                        <a:buNone/>
+                      </a:pPr>
+                      <a:r>
+                        <a:rPr cap="none" sz="1200" i="0" b="0" u="none">
+                          <a:solidFill>
+                            <a:srgbClr val="000000">
+                              <a:alpha val="100000"/>
+                            </a:srgbClr>
+                          </a:solidFill>
+                          <a:latin typeface="arial"/>
+                          <a:cs typeface="arial"/>
+                          <a:ea typeface="arial"/>
+                          <a:sym typeface="arial"/>
+                        </a:rPr>
+                        <a:t>Median</a:t>
+                      </a:r>
+                    </a:p>
+                  </a:txBody>
+                  <a:tcPr anchor="ctr" marB="38100" marT="38100" marR="0" marL="0">
+                    <a:lnL algn="ctr" cmpd="sng" cap="flat" w="0">
+                      <a:noFill/>
+                      <a:prstDash val="solid"/>
+                    </a:lnL>
+                    <a:lnR algn="ctr" cmpd="sng" cap="flat" w="0">
+                      <a:noFill/>
+                      <a:prstDash val="solid"/>
+                    </a:lnR>
+                    <a:lnT algn="ctr" cmpd="sng" cap="flat" w="0">
+                      <a:noFill/>
+                      <a:prstDash val="solid"/>
+                    </a:lnT>
+                    <a:lnB algn="ctr" cmpd="sng" cap="flat" w="0">
+                      <a:noFill/>
+                      <a:prstDash val="solid"/>
+                    </a:lnB>
+                    <a:solidFill>
+                      <a:srgbClr val="FF7D29">
+                        <a:alpha val="100000"/>
+                      </a:srgbClr>
+                    </a:solidFill>
+                  </a:tcPr>
+                </a:tc>
+                <a:tc>
+                  <a:txBody>
+                    <a:bodyPr/>
+                    <a:lstStyle/>
+                    <a:p>
+                      <a:pPr algn="ctr" marL="63500" marR="63500">
+                        <a:lnSpc>
+                          <a:spcPct val="100000"/>
+                        </a:lnSpc>
+                        <a:spcBef>
+                          <a:spcPts val="300"/>
+                        </a:spcBef>
+                        <a:spcAft>
+                          <a:spcPts val="300"/>
+                        </a:spcAft>
+                        <a:buNone/>
+                      </a:pPr>
+                      <a:r>
+                        <a:rPr cap="none" sz="1200" i="0" b="0" u="none">
+                          <a:solidFill>
+                            <a:srgbClr val="000000">
+                              <a:alpha val="100000"/>
+                            </a:srgbClr>
+                          </a:solidFill>
+                          <a:latin typeface="arial"/>
+                          <a:cs typeface="arial"/>
+                          <a:ea typeface="arial"/>
+                          <a:sym typeface="arial"/>
+                        </a:rPr>
+                        <a:t>33.00</a:t>
+                      </a:r>
+                    </a:p>
+                  </a:txBody>
+                  <a:tcPr anchor="ctr" marB="38100" marT="38100" marR="0" marL="0">
+                    <a:lnL algn="ctr" cmpd="sng" cap="flat" w="0">
+                      <a:noFill/>
+                      <a:prstDash val="solid"/>
+                    </a:lnL>
+                    <a:lnR algn="ctr" cmpd="sng" cap="flat" w="0">
+                      <a:noFill/>
+                      <a:prstDash val="solid"/>
+                    </a:lnR>
+                    <a:lnT algn="ctr" cmpd="sng" cap="flat" w="0">
+                      <a:noFill/>
+                      <a:prstDash val="solid"/>
+                    </a:lnT>
+                    <a:lnB algn="ctr" cmpd="sng" cap="flat" w="0">
+                      <a:noFill/>
+                      <a:prstDash val="solid"/>
+                    </a:lnB>
+                    <a:solidFill>
+                      <a:srgbClr val="FF7D29">
+                        <a:alpha val="100000"/>
+                      </a:srgbClr>
+                    </a:solidFill>
+                  </a:tcPr>
+                </a:tc>
+                <a:tc>
+                  <a:txBody>
+                    <a:bodyPr/>
+                    <a:lstStyle/>
+                    <a:p>
+                      <a:pPr algn="ctr" marL="63500" marR="63500">
+                        <a:lnSpc>
+                          <a:spcPct val="100000"/>
+                        </a:lnSpc>
+                        <a:spcBef>
+                          <a:spcPts val="300"/>
+                        </a:spcBef>
+                        <a:spcAft>
+                          <a:spcPts val="300"/>
+                        </a:spcAft>
+                        <a:buNone/>
+                      </a:pPr>
+                      <a:r>
+                        <a:rPr cap="none" sz="1200" i="0" b="0" u="none">
+                          <a:solidFill>
+                            <a:srgbClr val="000000">
+                              <a:alpha val="100000"/>
+                            </a:srgbClr>
+                          </a:solidFill>
+                          <a:latin typeface="arial"/>
+                          <a:cs typeface="arial"/>
+                          <a:ea typeface="arial"/>
+                          <a:sym typeface="arial"/>
+                        </a:rPr>
+                        <a:t>35.00</a:t>
+                      </a:r>
+                    </a:p>
+                  </a:txBody>
+                  <a:tcPr anchor="ctr" marB="38100" marT="38100" marR="0" marL="0">
+                    <a:lnL algn="ctr" cmpd="sng" cap="flat" w="0">
+                      <a:noFill/>
+                      <a:prstDash val="solid"/>
+                    </a:lnL>
+                    <a:lnR algn="ctr" cmpd="sng" cap="flat" w="0">
+                      <a:noFill/>
+                      <a:prstDash val="solid"/>
+                    </a:lnR>
+                    <a:lnT algn="ctr" cmpd="sng" cap="flat" w="0">
+                      <a:noFill/>
+                      <a:prstDash val="solid"/>
+                    </a:lnT>
+                    <a:lnB algn="ctr" cmpd="sng" cap="flat" w="0">
+                      <a:noFill/>
+                      <a:prstDash val="solid"/>
+                    </a:lnB>
+                    <a:solidFill>
+                      <a:srgbClr val="FF7D29">
+                        <a:alpha val="100000"/>
+                      </a:srgbClr>
+                    </a:solidFill>
+                  </a:tcPr>
+                </a:tc>
+                <a:tc>
+                  <a:txBody>
+                    <a:bodyPr/>
+                    <a:lstStyle/>
+                    <a:p>
+                      <a:pPr algn="ctr" marL="63500" marR="63500">
+                        <a:lnSpc>
+                          <a:spcPct val="100000"/>
+                        </a:lnSpc>
+                        <a:spcBef>
+                          <a:spcPts val="300"/>
+                        </a:spcBef>
+                        <a:spcAft>
+                          <a:spcPts val="300"/>
+                        </a:spcAft>
+                        <a:buNone/>
+                      </a:pPr>
+                      <a:r>
+                        <a:rPr cap="none" sz="1200" i="0" b="0" u="none">
+                          <a:solidFill>
+                            <a:srgbClr val="000000">
+                              <a:alpha val="100000"/>
+                            </a:srgbClr>
+                          </a:solidFill>
+                          <a:latin typeface="arial"/>
+                          <a:cs typeface="arial"/>
+                          <a:ea typeface="arial"/>
+                          <a:sym typeface="arial"/>
+                        </a:rPr>
+                        <a:t>35.00</a:t>
+                      </a:r>
+                    </a:p>
+                  </a:txBody>
+                  <a:tcPr anchor="ctr" marB="38100" marT="38100" marR="0" marL="0">
+                    <a:lnL algn="ctr" cmpd="sng" cap="flat" w="0">
+                      <a:noFill/>
+                      <a:prstDash val="solid"/>
+                    </a:lnL>
+                    <a:lnR algn="ctr" cmpd="sng" cap="flat" w="0">
+                      <a:noFill/>
+                      <a:prstDash val="solid"/>
+                    </a:lnR>
+                    <a:lnT algn="ctr" cmpd="sng" cap="flat" w="0">
+                      <a:noFill/>
+                      <a:prstDash val="solid"/>
+                    </a:lnT>
+                    <a:lnB algn="ctr" cmpd="sng" cap="flat" w="0">
+                      <a:noFill/>
+                      <a:prstDash val="solid"/>
+                    </a:lnB>
+                    <a:solidFill>
+                      <a:srgbClr val="FF7D29">
+                        <a:alpha val="100000"/>
+                      </a:srgbClr>
+                    </a:solidFill>
+                  </a:tcPr>
+                </a:tc>
+                <a:tc>
+                  <a:txBody>
+                    <a:bodyPr/>
+                    <a:lstStyle/>
+                    <a:p>
+                      <a:pPr algn="ctr" marL="63500" marR="63500">
+                        <a:lnSpc>
+                          <a:spcPct val="100000"/>
+                        </a:lnSpc>
+                        <a:spcBef>
+                          <a:spcPts val="300"/>
+                        </a:spcBef>
+                        <a:spcAft>
+                          <a:spcPts val="300"/>
+                        </a:spcAft>
+                        <a:buNone/>
+                      </a:pPr>
+                      <a:r>
+                        <a:rPr cap="none" sz="1200" i="0" b="0" u="none">
+                          <a:solidFill>
+                            <a:srgbClr val="000000">
+                              <a:alpha val="100000"/>
+                            </a:srgbClr>
+                          </a:solidFill>
+                          <a:latin typeface="arial"/>
+                          <a:cs typeface="arial"/>
+                          <a:ea typeface="arial"/>
+                          <a:sym typeface="arial"/>
+                        </a:rPr>
+                        <a:t>34.00</a:t>
+                      </a:r>
+                    </a:p>
+                  </a:txBody>
+                  <a:tcPr anchor="ctr" marB="38100" marT="38100" marR="0" marL="0">
+                    <a:lnL algn="ctr" cmpd="sng" cap="flat" w="0">
+                      <a:noFill/>
+                      <a:prstDash val="solid"/>
+                    </a:lnL>
+                    <a:lnR algn="ctr" cmpd="sng" cap="flat" w="0">
+                      <a:noFill/>
+                      <a:prstDash val="solid"/>
+                    </a:lnR>
+                    <a:lnT algn="ctr" cmpd="sng" cap="flat" w="0">
+                      <a:noFill/>
+                      <a:prstDash val="solid"/>
+                    </a:lnT>
+                    <a:lnB algn="ctr" cmpd="sng" cap="flat" w="0">
+                      <a:noFill/>
+                      <a:prstDash val="solid"/>
+                    </a:lnB>
+                    <a:solidFill>
+                      <a:srgbClr val="FF7D29">
+                        <a:alpha val="100000"/>
+                      </a:srgbClr>
+                    </a:solidFill>
+                  </a:tcPr>
+                </a:tc>
+              </a:tr>
+              <a:tr h="213519">
+                <a:tc>
+                  <a:txBody>
+                    <a:bodyPr/>
+                    <a:lstStyle/>
+                    <a:p>
+                      <a:pPr algn="l" marL="127000" marR="63500">
+                        <a:lnSpc>
+                          <a:spcPct val="100000"/>
+                        </a:lnSpc>
+                        <a:spcBef>
+                          <a:spcPts val="300"/>
+                        </a:spcBef>
+                        <a:spcAft>
+                          <a:spcPts val="300"/>
+                        </a:spcAft>
+                        <a:buNone/>
+                      </a:pPr>
+                      <a:r>
+                        <a:rPr cap="none" sz="1200" i="0" b="0" u="none">
+                          <a:solidFill>
+                            <a:srgbClr val="000000">
+                              <a:alpha val="100000"/>
+                            </a:srgbClr>
+                          </a:solidFill>
+                          <a:latin typeface="arial"/>
+                          <a:cs typeface="arial"/>
+                          <a:ea typeface="arial"/>
+                          <a:sym typeface="arial"/>
+                        </a:rPr>
+                        <a:t>Min - Max</a:t>
+                      </a:r>
+                    </a:p>
+                  </a:txBody>
+                  <a:tcPr anchor="ctr" marB="38100" marT="38100" marR="0" marL="0">
+                    <a:lnL algn="ctr" cmpd="sng" cap="flat" w="0">
+                      <a:noFill/>
+                      <a:prstDash val="solid"/>
+                    </a:lnL>
+                    <a:lnR algn="ctr" cmpd="sng" cap="flat" w="0">
+                      <a:noFill/>
+                      <a:prstDash val="solid"/>
+                    </a:lnR>
+                    <a:lnT algn="ctr" cmpd="sng" cap="flat" w="0">
+                      <a:noFill/>
+                      <a:prstDash val="solid"/>
+                    </a:lnT>
+                    <a:lnB algn="ctr" cmpd="sng" cap="flat" w="0">
+                      <a:noFill/>
+                      <a:prstDash val="solid"/>
+                    </a:lnB>
+                    <a:solidFill>
+                      <a:srgbClr val="FFBD69">
+                        <a:alpha val="100000"/>
+                      </a:srgbClr>
+                    </a:solidFill>
+                  </a:tcPr>
+                </a:tc>
+                <a:tc>
+                  <a:txBody>
+                    <a:bodyPr/>
+                    <a:lstStyle/>
+                    <a:p>
+                      <a:pPr algn="ctr" marL="63500" marR="63500">
+                        <a:lnSpc>
+                          <a:spcPct val="100000"/>
+                        </a:lnSpc>
+                        <a:spcBef>
+                          <a:spcPts val="300"/>
+                        </a:spcBef>
+                        <a:spcAft>
+                          <a:spcPts val="300"/>
+                        </a:spcAft>
+                        <a:buNone/>
+                      </a:pPr>
+                      <a:r>
+                        <a:rPr cap="none" sz="1200" i="0" b="0" u="none">
+                          <a:solidFill>
+                            <a:srgbClr val="000000">
+                              <a:alpha val="100000"/>
+                            </a:srgbClr>
+                          </a:solidFill>
+                          <a:latin typeface="arial"/>
+                          <a:cs typeface="arial"/>
+                          <a:ea typeface="arial"/>
+                          <a:sym typeface="arial"/>
+                        </a:rPr>
+                        <a:t>21.0 - 50.0</a:t>
+                      </a:r>
+                    </a:p>
+                  </a:txBody>
+                  <a:tcPr anchor="ctr" marB="38100" marT="38100" marR="0" marL="0">
+                    <a:lnL algn="ctr" cmpd="sng" cap="flat" w="0">
+                      <a:noFill/>
+                      <a:prstDash val="solid"/>
+                    </a:lnL>
+                    <a:lnR algn="ctr" cmpd="sng" cap="flat" w="0">
+                      <a:noFill/>
+                      <a:prstDash val="solid"/>
+                    </a:lnR>
+                    <a:lnT algn="ctr" cmpd="sng" cap="flat" w="0">
+                      <a:noFill/>
+                      <a:prstDash val="solid"/>
+                    </a:lnT>
+                    <a:lnB algn="ctr" cmpd="sng" cap="flat" w="0">
+                      <a:noFill/>
+                      <a:prstDash val="solid"/>
+                    </a:lnB>
+                    <a:solidFill>
+                      <a:srgbClr val="FFBD69">
+                        <a:alpha val="100000"/>
+                      </a:srgbClr>
+                    </a:solidFill>
+                  </a:tcPr>
+                </a:tc>
+                <a:tc>
+                  <a:txBody>
+                    <a:bodyPr/>
+                    <a:lstStyle/>
+                    <a:p>
+                      <a:pPr algn="ctr" marL="63500" marR="63500">
+                        <a:lnSpc>
+                          <a:spcPct val="100000"/>
+                        </a:lnSpc>
+                        <a:spcBef>
+                          <a:spcPts val="300"/>
+                        </a:spcBef>
+                        <a:spcAft>
+                          <a:spcPts val="300"/>
+                        </a:spcAft>
+                        <a:buNone/>
+                      </a:pPr>
+                      <a:r>
+                        <a:rPr cap="none" sz="1200" i="0" b="0" u="none">
+                          <a:solidFill>
+                            <a:srgbClr val="000000">
+                              <a:alpha val="100000"/>
+                            </a:srgbClr>
+                          </a:solidFill>
+                          <a:latin typeface="arial"/>
+                          <a:cs typeface="arial"/>
+                          <a:ea typeface="arial"/>
+                          <a:sym typeface="arial"/>
+                        </a:rPr>
+                        <a:t>21.0 - 62.0</a:t>
+                      </a:r>
+                    </a:p>
+                  </a:txBody>
+                  <a:tcPr anchor="ctr" marB="38100" marT="38100" marR="0" marL="0">
+                    <a:lnL algn="ctr" cmpd="sng" cap="flat" w="0">
+                      <a:noFill/>
+                      <a:prstDash val="solid"/>
+                    </a:lnL>
+                    <a:lnR algn="ctr" cmpd="sng" cap="flat" w="0">
+                      <a:noFill/>
+                      <a:prstDash val="solid"/>
+                    </a:lnR>
+                    <a:lnT algn="ctr" cmpd="sng" cap="flat" w="0">
+                      <a:noFill/>
+                      <a:prstDash val="solid"/>
+                    </a:lnT>
+                    <a:lnB algn="ctr" cmpd="sng" cap="flat" w="0">
+                      <a:noFill/>
+                      <a:prstDash val="solid"/>
+                    </a:lnB>
+                    <a:solidFill>
+                      <a:srgbClr val="FFBD69">
+                        <a:alpha val="100000"/>
+                      </a:srgbClr>
+                    </a:solidFill>
+                  </a:tcPr>
+                </a:tc>
+                <a:tc>
+                  <a:txBody>
+                    <a:bodyPr/>
+                    <a:lstStyle/>
+                    <a:p>
+                      <a:pPr algn="ctr" marL="63500" marR="63500">
+                        <a:lnSpc>
+                          <a:spcPct val="100000"/>
+                        </a:lnSpc>
+                        <a:spcBef>
+                          <a:spcPts val="300"/>
+                        </a:spcBef>
+                        <a:spcAft>
+                          <a:spcPts val="300"/>
+                        </a:spcAft>
+                        <a:buNone/>
+                      </a:pPr>
+                      <a:r>
+                        <a:rPr cap="none" sz="1200" i="0" b="0" u="none">
+                          <a:solidFill>
+                            <a:srgbClr val="000000">
+                              <a:alpha val="100000"/>
+                            </a:srgbClr>
+                          </a:solidFill>
+                          <a:latin typeface="arial"/>
+                          <a:cs typeface="arial"/>
+                          <a:ea typeface="arial"/>
+                          <a:sym typeface="arial"/>
+                        </a:rPr>
+                        <a:t>20.0 - 69.0</a:t>
+                      </a:r>
+                    </a:p>
+                  </a:txBody>
+                  <a:tcPr anchor="ctr" marB="38100" marT="38100" marR="0" marL="0">
+                    <a:lnL algn="ctr" cmpd="sng" cap="flat" w="0">
+                      <a:noFill/>
+                      <a:prstDash val="solid"/>
+                    </a:lnL>
+                    <a:lnR algn="ctr" cmpd="sng" cap="flat" w="0">
+                      <a:noFill/>
+                      <a:prstDash val="solid"/>
+                    </a:lnR>
+                    <a:lnT algn="ctr" cmpd="sng" cap="flat" w="0">
+                      <a:noFill/>
+                      <a:prstDash val="solid"/>
+                    </a:lnT>
+                    <a:lnB algn="ctr" cmpd="sng" cap="flat" w="0">
+                      <a:noFill/>
+                      <a:prstDash val="solid"/>
+                    </a:lnB>
+                    <a:solidFill>
+                      <a:srgbClr val="FFBD69">
+                        <a:alpha val="100000"/>
+                      </a:srgbClr>
+                    </a:solidFill>
+                  </a:tcPr>
+                </a:tc>
+                <a:tc>
+                  <a:txBody>
+                    <a:bodyPr/>
+                    <a:lstStyle/>
+                    <a:p>
+                      <a:pPr algn="ctr" marL="63500" marR="63500">
+                        <a:lnSpc>
+                          <a:spcPct val="100000"/>
+                        </a:lnSpc>
+                        <a:spcBef>
+                          <a:spcPts val="300"/>
+                        </a:spcBef>
+                        <a:spcAft>
+                          <a:spcPts val="300"/>
+                        </a:spcAft>
+                        <a:buNone/>
+                      </a:pPr>
+                      <a:r>
+                        <a:rPr cap="none" sz="1200" i="0" b="0" u="none">
+                          <a:solidFill>
+                            <a:srgbClr val="000000">
+                              <a:alpha val="100000"/>
+                            </a:srgbClr>
+                          </a:solidFill>
+                          <a:latin typeface="arial"/>
+                          <a:cs typeface="arial"/>
+                          <a:ea typeface="arial"/>
+                          <a:sym typeface="arial"/>
+                        </a:rPr>
+                        <a:t>20.0 - 69.0</a:t>
+                      </a:r>
+                    </a:p>
+                  </a:txBody>
+                  <a:tcPr anchor="ctr" marB="38100" marT="38100" marR="0" marL="0">
+                    <a:lnL algn="ctr" cmpd="sng" cap="flat" w="0">
+                      <a:noFill/>
+                      <a:prstDash val="solid"/>
+                    </a:lnL>
+                    <a:lnR algn="ctr" cmpd="sng" cap="flat" w="0">
+                      <a:noFill/>
+                      <a:prstDash val="solid"/>
+                    </a:lnR>
+                    <a:lnT algn="ctr" cmpd="sng" cap="flat" w="0">
+                      <a:noFill/>
+                      <a:prstDash val="solid"/>
+                    </a:lnT>
+                    <a:lnB algn="ctr" cmpd="sng" cap="flat" w="0">
+                      <a:noFill/>
+                      <a:prstDash val="solid"/>
+                    </a:lnB>
+                    <a:solidFill>
+                      <a:srgbClr val="FFBD69">
+                        <a:alpha val="100000"/>
+                      </a:srgbClr>
+                    </a:solidFill>
+                  </a:tcPr>
+                </a:tc>
+              </a:tr>
+              <a:tr h="228600">
+                <a:tc gridSpan="5">
+                  <a:txBody>
+                    <a:bodyPr/>
+                    <a:lstStyle/>
+                    <a:p>
+                      <a:pPr algn="l" marL="63500" marR="63500">
+                        <a:lnSpc>
+                          <a:spcPct val="100000"/>
+                        </a:lnSpc>
+                        <a:spcBef>
+                          <a:spcPts val="500"/>
+                        </a:spcBef>
+                        <a:spcAft>
+                          <a:spcPts val="500"/>
+                        </a:spcAft>
+                        <a:buNone/>
+                      </a:pPr>
+                      <a:r>
+                        <a:rPr cap="none" sz="1100" i="0" b="0" u="none">
+                          <a:solidFill>
+                            <a:srgbClr val="000000">
+                              <a:alpha val="100000"/>
+                            </a:srgbClr>
+                          </a:solidFill>
+                          <a:latin typeface="DejaVu Sans"/>
+                          <a:cs typeface="DejaVu Sans"/>
+                          <a:ea typeface="DejaVu Sans"/>
+                          <a:sym typeface="DejaVu Sans"/>
+                        </a:rPr>
+                        <a:t/>
+                      </a:r>
+                      <a:r>
+                        <a:rPr cap="none" sz="1100" i="0" b="0" u="none" baseline="40000">
+                          <a:solidFill>
+                            <a:srgbClr val="000000">
+                              <a:alpha val="100000"/>
+                            </a:srgbClr>
+                          </a:solidFill>
+                          <a:latin typeface="DejaVu Sans"/>
+                          <a:cs typeface="DejaVu Sans"/>
+                          <a:ea typeface="DejaVu Sans"/>
+                          <a:sym typeface="DejaVu Sans"/>
+                        </a:rPr>
+                        <a:t> </a:t>
+                      </a:r>
+                      <a:r>
+                        <a:rPr cap="none" sz="1100" i="0" b="0" u="none">
+                          <a:solidFill>
+                            <a:srgbClr val="000000">
+                              <a:alpha val="100000"/>
+                            </a:srgbClr>
+                          </a:solidFill>
+                          <a:latin typeface="DejaVu Sans"/>
+                          <a:cs typeface="DejaVu Sans"/>
+                          <a:ea typeface="DejaVu Sans"/>
+                          <a:sym typeface="DejaVu Sans"/>
+                        </a:rPr>
+                        <a:t>Confidential and for internal use only</a:t>
+                      </a:r>
+                      <a:r>
+                        <a:rPr cap="none" sz="1100" i="0" b="0" u="none">
+                          <a:solidFill>
+                            <a:srgbClr val="000000">
+                              <a:alpha val="100000"/>
+                            </a:srgbClr>
+                          </a:solidFill>
+                          <a:latin typeface="DejaVu Sans"/>
+                          <a:cs typeface="DejaVu Sans"/>
+                          <a:ea typeface="DejaVu Sans"/>
+                          <a:sym typeface="DejaVu Sans"/>
+                        </a:rPr>
+                        <a:t>; </a:t>
+                      </a:r>
+                    </a:p>
+                  </a:txBody>
+                  <a:tcPr anchor="ctr" marB="63500" marT="63500" marR="0" marL="0">
+                    <a:lnL algn="ctr" cmpd="sng" cap="flat" w="0">
+                      <a:noFill/>
+                      <a:prstDash val="solid"/>
+                    </a:lnL>
+                    <a:lnR algn="ctr" cmpd="sng" cap="flat" w="0">
+                      <a:noFill/>
+                      <a:prstDash val="solid"/>
+                    </a:lnR>
+                    <a:lnT algn="ctr" cmpd="sng" cap="flat" w="0">
+                      <a:noFill/>
+                      <a:prstDash val="solid"/>
+                    </a:lnT>
+                    <a:lnB algn="ctr" cmpd="sng" cap="flat" w="0">
+                      <a:noFill/>
+                      <a:prstDash val="solid"/>
+                    </a:lnB>
+                    <a:solidFill>
+                      <a:srgbClr val="FFFFFF">
+                        <a:alpha val="0"/>
+                      </a:srgbClr>
+                    </a:solidFill>
+                  </a:tcPr>
+                </a:tc>
+                <a:tc hMerge="true">
+                  <a:txBody>
+                    <a:bodyPr/>
+                    <a:lstStyle/>
+                    <a:p>
+                      <a:pPr algn="l" marL="63500" marR="63500">
+                        <a:lnSpc>
+                          <a:spcPct val="100000"/>
+                        </a:lnSpc>
+                        <a:spcBef>
+                          <a:spcPts val="500"/>
+                        </a:spcBef>
+                        <a:spcAft>
+                          <a:spcPts val="500"/>
+                        </a:spcAft>
+                        <a:buNone/>
+                      </a:pPr>
+                      <a:endParaRPr cap="none" sz="1100" i="0" b="0" u="none">
+                        <a:solidFill>
+                          <a:srgbClr val="000000">
+                            <a:alpha val="100000"/>
+                          </a:srgbClr>
+                        </a:solidFill>
+                        <a:latin typeface="DejaVu Sans"/>
+                        <a:cs typeface="DejaVu Sans"/>
+                        <a:ea typeface="DejaVu Sans"/>
+                        <a:sym typeface="DejaVu Sans"/>
+                      </a:endParaRPr>
+                      <a:r>
+                        <a:rPr cap="none" sz="1100" i="0" b="0" u="none">
+                          <a:solidFill>
+                            <a:srgbClr val="000000">
+                              <a:alpha val="100000"/>
+                            </a:srgbClr>
+                          </a:solidFill>
+                          <a:latin typeface="DejaVu Sans"/>
+                          <a:cs typeface="DejaVu Sans"/>
+                          <a:ea typeface="DejaVu Sans"/>
+                          <a:sym typeface="DejaVu Sans"/>
+                        </a:rPr>
+                        <a:t/>
+                      </a:r>
+                    </a:p>
+                  </a:txBody>
+                  <a:tcPr anchor="ctr" marB="63500" marT="63500" marR="0" marL="0">
+                    <a:lnL algn="ctr" cmpd="sng" cap="flat" w="0">
+                      <a:noFill/>
+                      <a:prstDash val="solid"/>
+                    </a:lnL>
+                    <a:lnR algn="ctr" cmpd="sng" cap="flat" w="0">
+                      <a:noFill/>
+                      <a:prstDash val="solid"/>
+                    </a:lnR>
+                    <a:lnT algn="ctr" cmpd="sng" cap="flat" w="0">
+                      <a:noFill/>
+                      <a:prstDash val="solid"/>
+                    </a:lnT>
+                    <a:lnB algn="ctr" cmpd="sng" cap="flat" w="0">
+                      <a:noFill/>
+                      <a:prstDash val="solid"/>
+                    </a:lnB>
+                    <a:solidFill>
+                      <a:srgbClr val="FFFFFF">
+                        <a:alpha val="0"/>
+                      </a:srgbClr>
+                    </a:solidFill>
+                  </a:tcPr>
+                </a:tc>
+                <a:tc hMerge="true">
+                  <a:txBody>
+                    <a:bodyPr/>
+                    <a:lstStyle/>
+                    <a:p>
+                      <a:pPr algn="l" marL="63500" marR="63500">
+                        <a:lnSpc>
+                          <a:spcPct val="100000"/>
+                        </a:lnSpc>
+                        <a:spcBef>
+                          <a:spcPts val="500"/>
+                        </a:spcBef>
+                        <a:spcAft>
+                          <a:spcPts val="500"/>
+                        </a:spcAft>
+                        <a:buNone/>
+                      </a:pPr>
+                      <a:endParaRPr cap="none" sz="1100" i="0" b="0" u="none">
+                        <a:solidFill>
+                          <a:srgbClr val="000000">
+                            <a:alpha val="100000"/>
+                          </a:srgbClr>
+                        </a:solidFill>
+                        <a:latin typeface="DejaVu Sans"/>
+                        <a:cs typeface="DejaVu Sans"/>
+                        <a:ea typeface="DejaVu Sans"/>
+                        <a:sym typeface="DejaVu Sans"/>
+                      </a:endParaRPr>
+                      <a:r>
+                        <a:rPr cap="none" sz="1100" i="0" b="0" u="none">
+                          <a:solidFill>
+                            <a:srgbClr val="000000">
+                              <a:alpha val="100000"/>
+                            </a:srgbClr>
+                          </a:solidFill>
+                          <a:latin typeface="DejaVu Sans"/>
+                          <a:cs typeface="DejaVu Sans"/>
+                          <a:ea typeface="DejaVu Sans"/>
+                          <a:sym typeface="DejaVu Sans"/>
+                        </a:rPr>
+                        <a:t/>
+                      </a:r>
+                    </a:p>
+                  </a:txBody>
+                  <a:tcPr anchor="ctr" marB="63500" marT="63500" marR="0" marL="0">
+                    <a:lnL algn="ctr" cmpd="sng" cap="flat" w="0">
+                      <a:noFill/>
+                      <a:prstDash val="solid"/>
+                    </a:lnL>
+                    <a:lnR algn="ctr" cmpd="sng" cap="flat" w="0">
+                      <a:noFill/>
+                      <a:prstDash val="solid"/>
+                    </a:lnR>
+                    <a:lnT algn="ctr" cmpd="sng" cap="flat" w="0">
+                      <a:noFill/>
+                      <a:prstDash val="solid"/>
+                    </a:lnT>
+                    <a:lnB algn="ctr" cmpd="sng" cap="flat" w="0">
+                      <a:noFill/>
+                      <a:prstDash val="solid"/>
+                    </a:lnB>
+                    <a:solidFill>
+                      <a:srgbClr val="FFFFFF">
+                        <a:alpha val="0"/>
+                      </a:srgbClr>
+                    </a:solidFill>
+                  </a:tcPr>
+                </a:tc>
+                <a:tc hMerge="true">
+                  <a:txBody>
+                    <a:bodyPr/>
+                    <a:lstStyle/>
+                    <a:p>
+                      <a:pPr algn="l" marL="63500" marR="63500">
+                        <a:lnSpc>
+                          <a:spcPct val="100000"/>
+                        </a:lnSpc>
+                        <a:spcBef>
+                          <a:spcPts val="500"/>
+                        </a:spcBef>
+                        <a:spcAft>
+                          <a:spcPts val="500"/>
+                        </a:spcAft>
+                        <a:buNone/>
+                      </a:pPr>
+                      <a:endParaRPr cap="none" sz="1100" i="0" b="0" u="none">
+                        <a:solidFill>
+                          <a:srgbClr val="000000">
+                            <a:alpha val="100000"/>
+                          </a:srgbClr>
+                        </a:solidFill>
+                        <a:latin typeface="DejaVu Sans"/>
+                        <a:cs typeface="DejaVu Sans"/>
+                        <a:ea typeface="DejaVu Sans"/>
+                        <a:sym typeface="DejaVu Sans"/>
+                      </a:endParaRPr>
+                      <a:r>
+                        <a:rPr cap="none" sz="1100" i="0" b="0" u="none">
+                          <a:solidFill>
+                            <a:srgbClr val="000000">
+                              <a:alpha val="100000"/>
+                            </a:srgbClr>
+                          </a:solidFill>
+                          <a:latin typeface="DejaVu Sans"/>
+                          <a:cs typeface="DejaVu Sans"/>
+                          <a:ea typeface="DejaVu Sans"/>
+                          <a:sym typeface="DejaVu Sans"/>
+                        </a:rPr>
+                        <a:t/>
+                      </a:r>
+                    </a:p>
+                  </a:txBody>
+                  <a:tcPr anchor="ctr" marB="63500" marT="63500" marR="0" marL="0">
+                    <a:lnL algn="ctr" cmpd="sng" cap="flat" w="0">
+                      <a:noFill/>
+                      <a:prstDash val="solid"/>
+                    </a:lnL>
+                    <a:lnR algn="ctr" cmpd="sng" cap="flat" w="0">
+                      <a:noFill/>
+                      <a:prstDash val="solid"/>
+                    </a:lnR>
+                    <a:lnT algn="ctr" cmpd="sng" cap="flat" w="0">
+                      <a:noFill/>
+                      <a:prstDash val="solid"/>
+                    </a:lnT>
+                    <a:lnB algn="ctr" cmpd="sng" cap="flat" w="0">
+                      <a:noFill/>
+                      <a:prstDash val="solid"/>
+                    </a:lnB>
+                    <a:solidFill>
+                      <a:srgbClr val="FFFFFF">
+                        <a:alpha val="0"/>
+                      </a:srgbClr>
+                    </a:solidFill>
+                  </a:tcPr>
+                </a:tc>
+                <a:tc hMerge="true">
+                  <a:txBody>
+                    <a:bodyPr/>
+                    <a:lstStyle/>
+                    <a:p>
+                      <a:pPr algn="l" marL="63500" marR="63500">
+                        <a:lnSpc>
+                          <a:spcPct val="100000"/>
+                        </a:lnSpc>
+                        <a:spcBef>
+                          <a:spcPts val="500"/>
+                        </a:spcBef>
+                        <a:spcAft>
+                          <a:spcPts val="500"/>
+                        </a:spcAft>
+                        <a:buNone/>
+                      </a:pPr>
+                      <a:endParaRPr cap="none" sz="1100" i="0" b="0" u="none">
+                        <a:solidFill>
+                          <a:srgbClr val="000000">
+                            <a:alpha val="100000"/>
+                          </a:srgbClr>
+                        </a:solidFill>
+                        <a:latin typeface="DejaVu Sans"/>
+                        <a:cs typeface="DejaVu Sans"/>
+                        <a:ea typeface="DejaVu Sans"/>
+                        <a:sym typeface="DejaVu Sans"/>
+                      </a:endParaRPr>
+                      <a:r>
+                        <a:rPr cap="none" sz="1100" i="0" b="0" u="none">
+                          <a:solidFill>
+                            <a:srgbClr val="000000">
+                              <a:alpha val="100000"/>
+                            </a:srgbClr>
+                          </a:solidFill>
+                          <a:latin typeface="DejaVu Sans"/>
+                          <a:cs typeface="DejaVu Sans"/>
+                          <a:ea typeface="DejaVu Sans"/>
+                          <a:sym typeface="DejaVu Sans"/>
+                        </a:rPr>
+                        <a:t/>
+                      </a:r>
+                    </a:p>
+                  </a:txBody>
+                  <a:tcPr anchor="ctr" marB="63500" marT="63500" marR="0" marL="0">
+                    <a:lnL algn="ctr" cmpd="sng" cap="flat" w="0">
+                      <a:noFill/>
+                      <a:prstDash val="solid"/>
+                    </a:lnL>
+                    <a:lnR algn="ctr" cmpd="sng" cap="flat" w="0">
+                      <a:noFill/>
+                      <a:prstDash val="solid"/>
+                    </a:lnR>
+                    <a:lnT algn="ctr" cmpd="sng" cap="flat" w="0">
+                      <a:noFill/>
+                      <a:prstDash val="solid"/>
+                    </a:lnT>
+                    <a:lnB algn="ctr" cmpd="sng" cap="flat" w="0">
+                      <a:noFill/>
+                      <a:prstDash val="solid"/>
+                    </a:lnB>
+                    <a:solidFill>
+                      <a:srgbClr val="FFFFFF">
+                        <a:alpha val="0"/>
+                      </a:srgbClr>
+                    </a:solidFill>
+                  </a:tcPr>
+                </a:tc>
+              </a:tr>
+            </a:tbl>
+          </a:graphicData>
+        </a:graphic>
+      </p:graphicFrame>
+      <p:sp>
+        <p:nvSpPr>
+          <p:cNvPr id="3" name="Title 1"/>
+          <p:cNvSpPr>
+            <a:spLocks noGrp="1"/>
+          </p:cNvSpPr>
+          <p:nvPr>
+            <p:ph type="title"/>
+          </p:nvPr>
+        </p:nvSpPr>
+        <p:spPr>
+          <a:xfrm>
+            <a:off x="838200" y="365125"/>
+            <a:ext cx="10515600" cy="1325563"/>
+          </a:xfrm>
+        </p:spPr>
+        <p:txBody>
+          <a:bodyPr/>
+          <a:lstStyle/>
+          <a:p>
+            <a:pPr algn="l" marL="0" marR="0">
+              <a:lnSpc>
+                <a:spcPct val="100000"/>
+              </a:lnSpc>
+              <a:spcBef>
+                <a:spcPts val="0"/>
+              </a:spcBef>
+              <a:spcAft>
+                <a:spcPts val="0"/>
+              </a:spcAft>
+              <a:buNone/>
+            </a:pPr>
+            <a:r>
+              <a:rPr cap="none" sz="2500" i="0" b="0" u="none">
+                <a:solidFill>
+                  <a:srgbClr val="1C2B39">
+                    <a:alpha val="100000"/>
+                  </a:srgbClr>
+                </a:solidFill>
+                <a:latin typeface="Arial"/>
+                <a:cs typeface="Arial"/>
+                <a:ea typeface="Arial"/>
+                <a:sym typeface="Arial"/>
+              </a:rPr>
+              <a:t>Demographic slide</a:t>
+            </a:r>
+          </a:p>
+        </p:txBody>
+      </p:sp>
+    </p:spTree>
+  </p:cSld>
+  <p:clrMapOvr>
+    <a:masterClrMapping/>
+  </p:clrMapOvr>
+</p:sld>
+</file>
+
 <file path=ppt/theme/theme1.xml><?xml version="1.0" encoding="utf-8"?>
 <a:theme xmlns:a="http://schemas.openxmlformats.org/drawingml/2006/main" name="Office Theme">
   <a:themeElements>

</xml_diff>

<commit_message>
Update pkgdown documentation 4b3fb998a103af7c08485ce2f4fa1253313daedb
</commit_message>
<xml_diff>
--- a/main/reference/output.pptx
+++ b/main/reference/output.pptx
@@ -3411,7 +3411,7 @@
           <p:nvPr/>
         </p:nvGraphicFramePr>
         <p:xfrm rot="0">
-          <a:off x="3666615" y="1165860"/>
+          <a:off x="2437579" y="1165860"/>
           <a:ext cx="3657600" cy="2743200"/>
         </p:xfrm>
         <a:graphic>
@@ -3420,9 +3420,11 @@
               <a:tblPr/>
               <a:tblGrid>
                 <a:gridCol w="1014348"/>
-                <a:gridCol w="1281474"/>
-                <a:gridCol w="1281474"/>
-                <a:gridCol w="1281474"/>
+                <a:gridCol w="1260499"/>
+                <a:gridCol w="1260499"/>
+                <a:gridCol w="1260499"/>
+                <a:gridCol w="1260499"/>
+                <a:gridCol w="1260499"/>
               </a:tblGrid>
               <a:tr h="261603">
                 <a:tc>
@@ -3667,6 +3669,120 @@
                     </a:solidFill>
                   </a:tcPr>
                 </a:tc>
+                <a:tc>
+                  <a:txBody>
+                    <a:bodyPr/>
+                    <a:lstStyle/>
+                    <a:p>
+                      <a:pPr algn="ctr" marL="63500" marR="63500">
+                        <a:lnSpc>
+                          <a:spcPct val="100000"/>
+                        </a:lnSpc>
+                        <a:spcBef>
+                          <a:spcPts val="300"/>
+                        </a:spcBef>
+                        <a:spcAft>
+                          <a:spcPts val="300"/>
+                        </a:spcAft>
+                        <a:buNone/>
+                      </a:pPr>
+                      <a:r>
+                        <a:rPr cap="none" sz="1400" i="0" b="1" u="none">
+                          <a:solidFill>
+                            <a:srgbClr val="FFFFFF">
+                              <a:alpha val="100000"/>
+                            </a:srgbClr>
+                          </a:solidFill>
+                          <a:latin typeface="arial"/>
+                          <a:cs typeface="arial"/>
+                          <a:ea typeface="arial"/>
+                          <a:sym typeface="arial"/>
+                        </a:rPr>
+                        <a:t>All Patients</a:t>
+                      </a:r>
+                    </a:p>
+                  </a:txBody>
+                  <a:tcPr anchor="ctr" marB="38100" marT="38100" marR="0" marL="0">
+                    <a:lnL algn="ctr" cmpd="sng" cap="flat" w="0">
+                      <a:noFill/>
+                      <a:prstDash val="solid"/>
+                    </a:lnL>
+                    <a:lnR algn="ctr" cmpd="sng" cap="flat" w="0">
+                      <a:noFill/>
+                      <a:prstDash val="solid"/>
+                    </a:lnR>
+                    <a:lnT algn="ctr" cmpd="sng" cap="flat" w="0">
+                      <a:noFill/>
+                      <a:prstDash val="solid"/>
+                    </a:lnT>
+                    <a:lnB algn="ctr" cmpd="sng" cap="flat" w="0">
+                      <a:noFill/>
+                      <a:prstDash val="solid"/>
+                    </a:lnB>
+                    <a:solidFill>
+                      <a:srgbClr val="ED4A0D">
+                        <a:alpha val="100000"/>
+                      </a:srgbClr>
+                    </a:solidFill>
+                  </a:tcPr>
+                </a:tc>
+                <a:tc>
+                  <a:txBody>
+                    <a:bodyPr/>
+                    <a:lstStyle/>
+                    <a:p>
+                      <a:pPr algn="ctr" marL="63500" marR="63500">
+                        <a:lnSpc>
+                          <a:spcPct val="100000"/>
+                        </a:lnSpc>
+                        <a:spcBef>
+                          <a:spcPts val="300"/>
+                        </a:spcBef>
+                        <a:spcAft>
+                          <a:spcPts val="300"/>
+                        </a:spcAft>
+                        <a:buNone/>
+                      </a:pPr>
+                      <a:r>
+                        <a:rPr cap="none" sz="1400" i="0" b="1" u="none">
+                          <a:solidFill>
+                            <a:srgbClr val="FFFFFF">
+                              <a:alpha val="100000"/>
+                            </a:srgbClr>
+                          </a:solidFill>
+                          <a:latin typeface="arial"/>
+                          <a:cs typeface="arial"/>
+                          <a:ea typeface="arial"/>
+                          <a:sym typeface="arial"/>
+                        </a:rPr>
+                        <a:t>All Patients</a:t>
+                      </a:r>
+                    </a:p>
+                  </a:txBody>
+                  <a:tcPr anchor="ctr" marB="38100" marT="38100" marR="0" marL="0">
+                    <a:lnL algn="ctr" cmpd="sng" cap="flat" w="0">
+                      <a:noFill/>
+                      <a:prstDash val="solid"/>
+                    </a:lnL>
+                    <a:lnR algn="ctr" cmpd="sng" cap="flat" w="0">
+                      <a:noFill/>
+                      <a:prstDash val="solid"/>
+                    </a:lnR>
+                    <a:lnT algn="ctr" cmpd="sng" cap="flat" w="0">
+                      <a:noFill/>
+                      <a:prstDash val="solid"/>
+                    </a:lnT>
+                    <a:lnB algn="ctr" cmpd="sng" cap="flat" w="0">
+                      <a:noFill/>
+                      <a:prstDash val="solid"/>
+                    </a:lnB>
+                    <a:solidFill>
+                      <a:srgbClr val="ED4A0D">
+                        <a:alpha val="100000"/>
+                      </a:srgbClr>
+                    </a:solidFill>
+                  </a:tcPr>
+                </a:tc>
               </a:tr>
               <a:tr h="209500">
                 <a:tc>
@@ -3930,525 +4046,6 @@
                     </a:solidFill>
                   </a:tcPr>
                 </a:tc>
-              </a:tr>
-              <a:tr h="243582">
-                <a:tc>
-                  <a:txBody>
-                    <a:bodyPr/>
-                    <a:lstStyle/>
-                    <a:p>
-                      <a:pPr algn="l" marL="127000" marR="63500">
-                        <a:lnSpc>
-                          <a:spcPct val="100000"/>
-                        </a:lnSpc>
-                        <a:spcBef>
-                          <a:spcPts val="300"/>
-                        </a:spcBef>
-                        <a:spcAft>
-                          <a:spcPts val="300"/>
-                        </a:spcAft>
-                        <a:buNone/>
-                      </a:pPr>
-                      <a:r>
-                        <a:rPr cap="none" sz="1200" i="0" b="0" u="none">
-                          <a:solidFill>
-                            <a:srgbClr val="000000">
-                              <a:alpha val="100000"/>
-                            </a:srgbClr>
-                          </a:solidFill>
-                          <a:latin typeface="arial"/>
-                          <a:cs typeface="arial"/>
-                          <a:ea typeface="arial"/>
-                          <a:sym typeface="arial"/>
-                        </a:rPr>
-                        <a:t>F</a:t>
-                      </a:r>
-                    </a:p>
-                  </a:txBody>
-                  <a:tcPr anchor="ctr" marB="38100" marT="38100" marR="0" marL="0">
-                    <a:lnL algn="ctr" cmpd="sng" cap="flat" w="0">
-                      <a:noFill/>
-                      <a:prstDash val="solid"/>
-                    </a:lnL>
-                    <a:lnR algn="ctr" cmpd="sng" cap="flat" w="0">
-                      <a:noFill/>
-                      <a:prstDash val="solid"/>
-                    </a:lnR>
-                    <a:lnT algn="ctr" cmpd="sng" cap="flat" w="0">
-                      <a:noFill/>
-                      <a:prstDash val="solid"/>
-                    </a:lnT>
-                    <a:lnB algn="ctr" cmpd="sng" cap="flat" w="0">
-                      <a:noFill/>
-                      <a:prstDash val="solid"/>
-                    </a:lnB>
-                    <a:solidFill>
-                      <a:srgbClr val="FFBD69">
-                        <a:alpha val="100000"/>
-                      </a:srgbClr>
-                    </a:solidFill>
-                  </a:tcPr>
-                </a:tc>
-                <a:tc>
-                  <a:txBody>
-                    <a:bodyPr/>
-                    <a:lstStyle/>
-                    <a:p>
-                      <a:pPr algn="ctr" marL="63500" marR="63500">
-                        <a:lnSpc>
-                          <a:spcPct val="100000"/>
-                        </a:lnSpc>
-                        <a:spcBef>
-                          <a:spcPts val="300"/>
-                        </a:spcBef>
-                        <a:spcAft>
-                          <a:spcPts val="300"/>
-                        </a:spcAft>
-                        <a:buNone/>
-                      </a:pPr>
-                      <a:r>
-                        <a:rPr cap="none" sz="1200" i="0" b="0" u="none">
-                          <a:solidFill>
-                            <a:srgbClr val="000000">
-                              <a:alpha val="100000"/>
-                            </a:srgbClr>
-                          </a:solidFill>
-                          <a:latin typeface="arial"/>
-                          <a:cs typeface="arial"/>
-                          <a:ea typeface="arial"/>
-                          <a:sym typeface="arial"/>
-                        </a:rPr>
-                        <a:t>79 (59%)</a:t>
-                      </a:r>
-                    </a:p>
-                  </a:txBody>
-                  <a:tcPr anchor="ctr" marB="38100" marT="38100" marR="0" marL="0">
-                    <a:lnL algn="ctr" cmpd="sng" cap="flat" w="0">
-                      <a:noFill/>
-                      <a:prstDash val="solid"/>
-                    </a:lnL>
-                    <a:lnR algn="ctr" cmpd="sng" cap="flat" w="0">
-                      <a:noFill/>
-                      <a:prstDash val="solid"/>
-                    </a:lnR>
-                    <a:lnT algn="ctr" cmpd="sng" cap="flat" w="0">
-                      <a:noFill/>
-                      <a:prstDash val="solid"/>
-                    </a:lnT>
-                    <a:lnB algn="ctr" cmpd="sng" cap="flat" w="0">
-                      <a:noFill/>
-                      <a:prstDash val="solid"/>
-                    </a:lnB>
-                    <a:solidFill>
-                      <a:srgbClr val="FFBD69">
-                        <a:alpha val="100000"/>
-                      </a:srgbClr>
-                    </a:solidFill>
-                  </a:tcPr>
-                </a:tc>
-                <a:tc>
-                  <a:txBody>
-                    <a:bodyPr/>
-                    <a:lstStyle/>
-                    <a:p>
-                      <a:pPr algn="ctr" marL="63500" marR="63500">
-                        <a:lnSpc>
-                          <a:spcPct val="100000"/>
-                        </a:lnSpc>
-                        <a:spcBef>
-                          <a:spcPts val="300"/>
-                        </a:spcBef>
-                        <a:spcAft>
-                          <a:spcPts val="300"/>
-                        </a:spcAft>
-                        <a:buNone/>
-                      </a:pPr>
-                      <a:r>
-                        <a:rPr cap="none" sz="1200" i="0" b="0" u="none">
-                          <a:solidFill>
-                            <a:srgbClr val="000000">
-                              <a:alpha val="100000"/>
-                            </a:srgbClr>
-                          </a:solidFill>
-                          <a:latin typeface="arial"/>
-                          <a:cs typeface="arial"/>
-                          <a:ea typeface="arial"/>
-                          <a:sym typeface="arial"/>
-                        </a:rPr>
-                        <a:t>82 (61.2%)</a:t>
-                      </a:r>
-                    </a:p>
-                  </a:txBody>
-                  <a:tcPr anchor="ctr" marB="38100" marT="38100" marR="0" marL="0">
-                    <a:lnL algn="ctr" cmpd="sng" cap="flat" w="0">
-                      <a:noFill/>
-                      <a:prstDash val="solid"/>
-                    </a:lnL>
-                    <a:lnR algn="ctr" cmpd="sng" cap="flat" w="0">
-                      <a:noFill/>
-                      <a:prstDash val="solid"/>
-                    </a:lnR>
-                    <a:lnT algn="ctr" cmpd="sng" cap="flat" w="0">
-                      <a:noFill/>
-                      <a:prstDash val="solid"/>
-                    </a:lnT>
-                    <a:lnB algn="ctr" cmpd="sng" cap="flat" w="0">
-                      <a:noFill/>
-                      <a:prstDash val="solid"/>
-                    </a:lnB>
-                    <a:solidFill>
-                      <a:srgbClr val="FFBD69">
-                        <a:alpha val="100000"/>
-                      </a:srgbClr>
-                    </a:solidFill>
-                  </a:tcPr>
-                </a:tc>
-                <a:tc>
-                  <a:txBody>
-                    <a:bodyPr/>
-                    <a:lstStyle/>
-                    <a:p>
-                      <a:pPr algn="ctr" marL="63500" marR="63500">
-                        <a:lnSpc>
-                          <a:spcPct val="100000"/>
-                        </a:lnSpc>
-                        <a:spcBef>
-                          <a:spcPts val="300"/>
-                        </a:spcBef>
-                        <a:spcAft>
-                          <a:spcPts val="300"/>
-                        </a:spcAft>
-                        <a:buNone/>
-                      </a:pPr>
-                      <a:r>
-                        <a:rPr cap="none" sz="1200" i="0" b="0" u="none">
-                          <a:solidFill>
-                            <a:srgbClr val="000000">
-                              <a:alpha val="100000"/>
-                            </a:srgbClr>
-                          </a:solidFill>
-                          <a:latin typeface="arial"/>
-                          <a:cs typeface="arial"/>
-                          <a:ea typeface="arial"/>
-                          <a:sym typeface="arial"/>
-                        </a:rPr>
-                        <a:t>70 (53%)</a:t>
-                      </a:r>
-                    </a:p>
-                  </a:txBody>
-                  <a:tcPr anchor="ctr" marB="38100" marT="38100" marR="0" marL="0">
-                    <a:lnL algn="ctr" cmpd="sng" cap="flat" w="0">
-                      <a:noFill/>
-                      <a:prstDash val="solid"/>
-                    </a:lnL>
-                    <a:lnR algn="ctr" cmpd="sng" cap="flat" w="0">
-                      <a:noFill/>
-                      <a:prstDash val="solid"/>
-                    </a:lnR>
-                    <a:lnT algn="ctr" cmpd="sng" cap="flat" w="0">
-                      <a:noFill/>
-                      <a:prstDash val="solid"/>
-                    </a:lnT>
-                    <a:lnB algn="ctr" cmpd="sng" cap="flat" w="0">
-                      <a:noFill/>
-                      <a:prstDash val="solid"/>
-                    </a:lnB>
-                    <a:solidFill>
-                      <a:srgbClr val="FFBD69">
-                        <a:alpha val="100000"/>
-                      </a:srgbClr>
-                    </a:solidFill>
-                  </a:tcPr>
-                </a:tc>
-              </a:tr>
-              <a:tr h="243582">
-                <a:tc>
-                  <a:txBody>
-                    <a:bodyPr/>
-                    <a:lstStyle/>
-                    <a:p>
-                      <a:pPr algn="l" marL="127000" marR="63500">
-                        <a:lnSpc>
-                          <a:spcPct val="100000"/>
-                        </a:lnSpc>
-                        <a:spcBef>
-                          <a:spcPts val="300"/>
-                        </a:spcBef>
-                        <a:spcAft>
-                          <a:spcPts val="300"/>
-                        </a:spcAft>
-                        <a:buNone/>
-                      </a:pPr>
-                      <a:r>
-                        <a:rPr cap="none" sz="1200" i="0" b="0" u="none">
-                          <a:solidFill>
-                            <a:srgbClr val="000000">
-                              <a:alpha val="100000"/>
-                            </a:srgbClr>
-                          </a:solidFill>
-                          <a:latin typeface="arial"/>
-                          <a:cs typeface="arial"/>
-                          <a:ea typeface="arial"/>
-                          <a:sym typeface="arial"/>
-                        </a:rPr>
-                        <a:t>M</a:t>
-                      </a:r>
-                    </a:p>
-                  </a:txBody>
-                  <a:tcPr anchor="ctr" marB="38100" marT="38100" marR="0" marL="0">
-                    <a:lnL algn="ctr" cmpd="sng" cap="flat" w="0">
-                      <a:noFill/>
-                      <a:prstDash val="solid"/>
-                    </a:lnL>
-                    <a:lnR algn="ctr" cmpd="sng" cap="flat" w="0">
-                      <a:noFill/>
-                      <a:prstDash val="solid"/>
-                    </a:lnR>
-                    <a:lnT algn="ctr" cmpd="sng" cap="flat" w="0">
-                      <a:noFill/>
-                      <a:prstDash val="solid"/>
-                    </a:lnT>
-                    <a:lnB algn="ctr" cmpd="sng" cap="flat" w="0">
-                      <a:noFill/>
-                      <a:prstDash val="solid"/>
-                    </a:lnB>
-                    <a:solidFill>
-                      <a:srgbClr val="FF7D29">
-                        <a:alpha val="100000"/>
-                      </a:srgbClr>
-                    </a:solidFill>
-                  </a:tcPr>
-                </a:tc>
-                <a:tc>
-                  <a:txBody>
-                    <a:bodyPr/>
-                    <a:lstStyle/>
-                    <a:p>
-                      <a:pPr algn="ctr" marL="63500" marR="63500">
-                        <a:lnSpc>
-                          <a:spcPct val="100000"/>
-                        </a:lnSpc>
-                        <a:spcBef>
-                          <a:spcPts val="300"/>
-                        </a:spcBef>
-                        <a:spcAft>
-                          <a:spcPts val="300"/>
-                        </a:spcAft>
-                        <a:buNone/>
-                      </a:pPr>
-                      <a:r>
-                        <a:rPr cap="none" sz="1200" i="0" b="0" u="none">
-                          <a:solidFill>
-                            <a:srgbClr val="000000">
-                              <a:alpha val="100000"/>
-                            </a:srgbClr>
-                          </a:solidFill>
-                          <a:latin typeface="arial"/>
-                          <a:cs typeface="arial"/>
-                          <a:ea typeface="arial"/>
-                          <a:sym typeface="arial"/>
-                        </a:rPr>
-                        <a:t>55 (41%)</a:t>
-                      </a:r>
-                    </a:p>
-                  </a:txBody>
-                  <a:tcPr anchor="ctr" marB="38100" marT="38100" marR="0" marL="0">
-                    <a:lnL algn="ctr" cmpd="sng" cap="flat" w="0">
-                      <a:noFill/>
-                      <a:prstDash val="solid"/>
-                    </a:lnL>
-                    <a:lnR algn="ctr" cmpd="sng" cap="flat" w="0">
-                      <a:noFill/>
-                      <a:prstDash val="solid"/>
-                    </a:lnR>
-                    <a:lnT algn="ctr" cmpd="sng" cap="flat" w="0">
-                      <a:noFill/>
-                      <a:prstDash val="solid"/>
-                    </a:lnT>
-                    <a:lnB algn="ctr" cmpd="sng" cap="flat" w="0">
-                      <a:noFill/>
-                      <a:prstDash val="solid"/>
-                    </a:lnB>
-                    <a:solidFill>
-                      <a:srgbClr val="FF7D29">
-                        <a:alpha val="100000"/>
-                      </a:srgbClr>
-                    </a:solidFill>
-                  </a:tcPr>
-                </a:tc>
-                <a:tc>
-                  <a:txBody>
-                    <a:bodyPr/>
-                    <a:lstStyle/>
-                    <a:p>
-                      <a:pPr algn="ctr" marL="63500" marR="63500">
-                        <a:lnSpc>
-                          <a:spcPct val="100000"/>
-                        </a:lnSpc>
-                        <a:spcBef>
-                          <a:spcPts val="300"/>
-                        </a:spcBef>
-                        <a:spcAft>
-                          <a:spcPts val="300"/>
-                        </a:spcAft>
-                        <a:buNone/>
-                      </a:pPr>
-                      <a:r>
-                        <a:rPr cap="none" sz="1200" i="0" b="0" u="none">
-                          <a:solidFill>
-                            <a:srgbClr val="000000">
-                              <a:alpha val="100000"/>
-                            </a:srgbClr>
-                          </a:solidFill>
-                          <a:latin typeface="arial"/>
-                          <a:cs typeface="arial"/>
-                          <a:ea typeface="arial"/>
-                          <a:sym typeface="arial"/>
-                        </a:rPr>
-                        <a:t>52 (38.8%)</a:t>
-                      </a:r>
-                    </a:p>
-                  </a:txBody>
-                  <a:tcPr anchor="ctr" marB="38100" marT="38100" marR="0" marL="0">
-                    <a:lnL algn="ctr" cmpd="sng" cap="flat" w="0">
-                      <a:noFill/>
-                      <a:prstDash val="solid"/>
-                    </a:lnL>
-                    <a:lnR algn="ctr" cmpd="sng" cap="flat" w="0">
-                      <a:noFill/>
-                      <a:prstDash val="solid"/>
-                    </a:lnR>
-                    <a:lnT algn="ctr" cmpd="sng" cap="flat" w="0">
-                      <a:noFill/>
-                      <a:prstDash val="solid"/>
-                    </a:lnT>
-                    <a:lnB algn="ctr" cmpd="sng" cap="flat" w="0">
-                      <a:noFill/>
-                      <a:prstDash val="solid"/>
-                    </a:lnB>
-                    <a:solidFill>
-                      <a:srgbClr val="FF7D29">
-                        <a:alpha val="100000"/>
-                      </a:srgbClr>
-                    </a:solidFill>
-                  </a:tcPr>
-                </a:tc>
-                <a:tc>
-                  <a:txBody>
-                    <a:bodyPr/>
-                    <a:lstStyle/>
-                    <a:p>
-                      <a:pPr algn="ctr" marL="63500" marR="63500">
-                        <a:lnSpc>
-                          <a:spcPct val="100000"/>
-                        </a:lnSpc>
-                        <a:spcBef>
-                          <a:spcPts val="300"/>
-                        </a:spcBef>
-                        <a:spcAft>
-                          <a:spcPts val="300"/>
-                        </a:spcAft>
-                        <a:buNone/>
-                      </a:pPr>
-                      <a:r>
-                        <a:rPr cap="none" sz="1200" i="0" b="0" u="none">
-                          <a:solidFill>
-                            <a:srgbClr val="000000">
-                              <a:alpha val="100000"/>
-                            </a:srgbClr>
-                          </a:solidFill>
-                          <a:latin typeface="arial"/>
-                          <a:cs typeface="arial"/>
-                          <a:ea typeface="arial"/>
-                          <a:sym typeface="arial"/>
-                        </a:rPr>
-                        <a:t>62 (47%)</a:t>
-                      </a:r>
-                    </a:p>
-                  </a:txBody>
-                  <a:tcPr anchor="ctr" marB="38100" marT="38100" marR="0" marL="0">
-                    <a:lnL algn="ctr" cmpd="sng" cap="flat" w="0">
-                      <a:noFill/>
-                      <a:prstDash val="solid"/>
-                    </a:lnL>
-                    <a:lnR algn="ctr" cmpd="sng" cap="flat" w="0">
-                      <a:noFill/>
-                      <a:prstDash val="solid"/>
-                    </a:lnR>
-                    <a:lnT algn="ctr" cmpd="sng" cap="flat" w="0">
-                      <a:noFill/>
-                      <a:prstDash val="solid"/>
-                    </a:lnT>
-                    <a:lnB algn="ctr" cmpd="sng" cap="flat" w="0">
-                      <a:noFill/>
-                      <a:prstDash val="solid"/>
-                    </a:lnB>
-                    <a:solidFill>
-                      <a:srgbClr val="FF7D29">
-                        <a:alpha val="100000"/>
-                      </a:srgbClr>
-                    </a:solidFill>
-                  </a:tcPr>
-                </a:tc>
-              </a:tr>
-              <a:tr h="238075">
-                <a:tc>
-                  <a:txBody>
-                    <a:bodyPr/>
-                    <a:lstStyle/>
-                    <a:p>
-                      <a:pPr algn="l" marL="127000" marR="63500">
-                        <a:lnSpc>
-                          <a:spcPct val="100000"/>
-                        </a:lnSpc>
-                        <a:spcBef>
-                          <a:spcPts val="300"/>
-                        </a:spcBef>
-                        <a:spcAft>
-                          <a:spcPts val="300"/>
-                        </a:spcAft>
-                        <a:buNone/>
-                      </a:pPr>
-                      <a:r>
-                        <a:rPr cap="none" sz="1200" i="0" b="0" u="none">
-                          <a:solidFill>
-                            <a:srgbClr val="000000">
-                              <a:alpha val="100000"/>
-                            </a:srgbClr>
-                          </a:solidFill>
-                          <a:latin typeface="arial"/>
-                          <a:cs typeface="arial"/>
-                          <a:ea typeface="arial"/>
-                          <a:sym typeface="arial"/>
-                        </a:rPr>
-                        <a:t>Age</a:t>
-                      </a:r>
-                    </a:p>
-                  </a:txBody>
-                  <a:tcPr anchor="ctr" marB="38100" marT="38100" marR="0" marL="0">
-                    <a:lnL algn="ctr" cmpd="sng" cap="flat" w="0">
-                      <a:noFill/>
-                      <a:prstDash val="solid"/>
-                    </a:lnL>
-                    <a:lnR algn="ctr" cmpd="sng" cap="flat" w="0">
-                      <a:noFill/>
-                      <a:prstDash val="solid"/>
-                    </a:lnR>
-                    <a:lnT algn="ctr" cmpd="sng" cap="flat" w="0">
-                      <a:noFill/>
-                      <a:prstDash val="solid"/>
-                    </a:lnT>
-                    <a:lnB algn="ctr" cmpd="sng" cap="flat" w="0">
-                      <a:noFill/>
-                      <a:prstDash val="solid"/>
-                    </a:lnB>
-                    <a:solidFill>
-                      <a:srgbClr val="FFBD69">
-                        <a:alpha val="100000"/>
-                      </a:srgbClr>
-                    </a:solidFill>
-                  </a:tcPr>
-                </a:tc>
                 <a:tc>
                   <a:txBody>
                     <a:bodyPr/>
@@ -4511,7 +4108,7 @@
                       <a:prstDash val="solid"/>
                     </a:lnB>
                     <a:solidFill>
-                      <a:srgbClr val="FFBD69">
+                      <a:srgbClr val="FF7D29">
                         <a:alpha val="100000"/>
                       </a:srgbClr>
                     </a:solidFill>
@@ -4579,6 +4176,753 @@
                       <a:prstDash val="solid"/>
                     </a:lnB>
                     <a:solidFill>
+                      <a:srgbClr val="FF7D29">
+                        <a:alpha val="100000"/>
+                      </a:srgbClr>
+                    </a:solidFill>
+                  </a:tcPr>
+                </a:tc>
+              </a:tr>
+              <a:tr h="243582">
+                <a:tc>
+                  <a:txBody>
+                    <a:bodyPr/>
+                    <a:lstStyle/>
+                    <a:p>
+                      <a:pPr algn="l" marL="127000" marR="63500">
+                        <a:lnSpc>
+                          <a:spcPct val="100000"/>
+                        </a:lnSpc>
+                        <a:spcBef>
+                          <a:spcPts val="300"/>
+                        </a:spcBef>
+                        <a:spcAft>
+                          <a:spcPts val="300"/>
+                        </a:spcAft>
+                        <a:buNone/>
+                      </a:pPr>
+                      <a:r>
+                        <a:rPr cap="none" sz="1200" i="0" b="0" u="none">
+                          <a:solidFill>
+                            <a:srgbClr val="000000">
+                              <a:alpha val="100000"/>
+                            </a:srgbClr>
+                          </a:solidFill>
+                          <a:latin typeface="arial"/>
+                          <a:cs typeface="arial"/>
+                          <a:ea typeface="arial"/>
+                          <a:sym typeface="arial"/>
+                        </a:rPr>
+                        <a:t>F</a:t>
+                      </a:r>
+                    </a:p>
+                  </a:txBody>
+                  <a:tcPr anchor="ctr" marB="38100" marT="38100" marR="0" marL="0">
+                    <a:lnL algn="ctr" cmpd="sng" cap="flat" w="0">
+                      <a:noFill/>
+                      <a:prstDash val="solid"/>
+                    </a:lnL>
+                    <a:lnR algn="ctr" cmpd="sng" cap="flat" w="0">
+                      <a:noFill/>
+                      <a:prstDash val="solid"/>
+                    </a:lnR>
+                    <a:lnT algn="ctr" cmpd="sng" cap="flat" w="0">
+                      <a:noFill/>
+                      <a:prstDash val="solid"/>
+                    </a:lnT>
+                    <a:lnB algn="ctr" cmpd="sng" cap="flat" w="0">
+                      <a:noFill/>
+                      <a:prstDash val="solid"/>
+                    </a:lnB>
+                    <a:solidFill>
+                      <a:srgbClr val="FFBD69">
+                        <a:alpha val="100000"/>
+                      </a:srgbClr>
+                    </a:solidFill>
+                  </a:tcPr>
+                </a:tc>
+                <a:tc>
+                  <a:txBody>
+                    <a:bodyPr/>
+                    <a:lstStyle/>
+                    <a:p>
+                      <a:pPr algn="ctr" marL="63500" marR="63500">
+                        <a:lnSpc>
+                          <a:spcPct val="100000"/>
+                        </a:lnSpc>
+                        <a:spcBef>
+                          <a:spcPts val="300"/>
+                        </a:spcBef>
+                        <a:spcAft>
+                          <a:spcPts val="300"/>
+                        </a:spcAft>
+                        <a:buNone/>
+                      </a:pPr>
+                      <a:r>
+                        <a:rPr cap="none" sz="1200" i="0" b="0" u="none">
+                          <a:solidFill>
+                            <a:srgbClr val="000000">
+                              <a:alpha val="100000"/>
+                            </a:srgbClr>
+                          </a:solidFill>
+                          <a:latin typeface="arial"/>
+                          <a:cs typeface="arial"/>
+                          <a:ea typeface="arial"/>
+                          <a:sym typeface="arial"/>
+                        </a:rPr>
+                        <a:t>79 (59%)</a:t>
+                      </a:r>
+                    </a:p>
+                  </a:txBody>
+                  <a:tcPr anchor="ctr" marB="38100" marT="38100" marR="0" marL="0">
+                    <a:lnL algn="ctr" cmpd="sng" cap="flat" w="0">
+                      <a:noFill/>
+                      <a:prstDash val="solid"/>
+                    </a:lnL>
+                    <a:lnR algn="ctr" cmpd="sng" cap="flat" w="0">
+                      <a:noFill/>
+                      <a:prstDash val="solid"/>
+                    </a:lnR>
+                    <a:lnT algn="ctr" cmpd="sng" cap="flat" w="0">
+                      <a:noFill/>
+                      <a:prstDash val="solid"/>
+                    </a:lnT>
+                    <a:lnB algn="ctr" cmpd="sng" cap="flat" w="0">
+                      <a:noFill/>
+                      <a:prstDash val="solid"/>
+                    </a:lnB>
+                    <a:solidFill>
+                      <a:srgbClr val="FFBD69">
+                        <a:alpha val="100000"/>
+                      </a:srgbClr>
+                    </a:solidFill>
+                  </a:tcPr>
+                </a:tc>
+                <a:tc>
+                  <a:txBody>
+                    <a:bodyPr/>
+                    <a:lstStyle/>
+                    <a:p>
+                      <a:pPr algn="ctr" marL="63500" marR="63500">
+                        <a:lnSpc>
+                          <a:spcPct val="100000"/>
+                        </a:lnSpc>
+                        <a:spcBef>
+                          <a:spcPts val="300"/>
+                        </a:spcBef>
+                        <a:spcAft>
+                          <a:spcPts val="300"/>
+                        </a:spcAft>
+                        <a:buNone/>
+                      </a:pPr>
+                      <a:r>
+                        <a:rPr cap="none" sz="1200" i="0" b="0" u="none">
+                          <a:solidFill>
+                            <a:srgbClr val="000000">
+                              <a:alpha val="100000"/>
+                            </a:srgbClr>
+                          </a:solidFill>
+                          <a:latin typeface="arial"/>
+                          <a:cs typeface="arial"/>
+                          <a:ea typeface="arial"/>
+                          <a:sym typeface="arial"/>
+                        </a:rPr>
+                        <a:t>82 (61.2%)</a:t>
+                      </a:r>
+                    </a:p>
+                  </a:txBody>
+                  <a:tcPr anchor="ctr" marB="38100" marT="38100" marR="0" marL="0">
+                    <a:lnL algn="ctr" cmpd="sng" cap="flat" w="0">
+                      <a:noFill/>
+                      <a:prstDash val="solid"/>
+                    </a:lnL>
+                    <a:lnR algn="ctr" cmpd="sng" cap="flat" w="0">
+                      <a:noFill/>
+                      <a:prstDash val="solid"/>
+                    </a:lnR>
+                    <a:lnT algn="ctr" cmpd="sng" cap="flat" w="0">
+                      <a:noFill/>
+                      <a:prstDash val="solid"/>
+                    </a:lnT>
+                    <a:lnB algn="ctr" cmpd="sng" cap="flat" w="0">
+                      <a:noFill/>
+                      <a:prstDash val="solid"/>
+                    </a:lnB>
+                    <a:solidFill>
+                      <a:srgbClr val="FFBD69">
+                        <a:alpha val="100000"/>
+                      </a:srgbClr>
+                    </a:solidFill>
+                  </a:tcPr>
+                </a:tc>
+                <a:tc>
+                  <a:txBody>
+                    <a:bodyPr/>
+                    <a:lstStyle/>
+                    <a:p>
+                      <a:pPr algn="ctr" marL="63500" marR="63500">
+                        <a:lnSpc>
+                          <a:spcPct val="100000"/>
+                        </a:lnSpc>
+                        <a:spcBef>
+                          <a:spcPts val="300"/>
+                        </a:spcBef>
+                        <a:spcAft>
+                          <a:spcPts val="300"/>
+                        </a:spcAft>
+                        <a:buNone/>
+                      </a:pPr>
+                      <a:r>
+                        <a:rPr cap="none" sz="1200" i="0" b="0" u="none">
+                          <a:solidFill>
+                            <a:srgbClr val="000000">
+                              <a:alpha val="100000"/>
+                            </a:srgbClr>
+                          </a:solidFill>
+                          <a:latin typeface="arial"/>
+                          <a:cs typeface="arial"/>
+                          <a:ea typeface="arial"/>
+                          <a:sym typeface="arial"/>
+                        </a:rPr>
+                        <a:t>70 (53%)</a:t>
+                      </a:r>
+                    </a:p>
+                  </a:txBody>
+                  <a:tcPr anchor="ctr" marB="38100" marT="38100" marR="0" marL="0">
+                    <a:lnL algn="ctr" cmpd="sng" cap="flat" w="0">
+                      <a:noFill/>
+                      <a:prstDash val="solid"/>
+                    </a:lnL>
+                    <a:lnR algn="ctr" cmpd="sng" cap="flat" w="0">
+                      <a:noFill/>
+                      <a:prstDash val="solid"/>
+                    </a:lnR>
+                    <a:lnT algn="ctr" cmpd="sng" cap="flat" w="0">
+                      <a:noFill/>
+                      <a:prstDash val="solid"/>
+                    </a:lnT>
+                    <a:lnB algn="ctr" cmpd="sng" cap="flat" w="0">
+                      <a:noFill/>
+                      <a:prstDash val="solid"/>
+                    </a:lnB>
+                    <a:solidFill>
+                      <a:srgbClr val="FFBD69">
+                        <a:alpha val="100000"/>
+                      </a:srgbClr>
+                    </a:solidFill>
+                  </a:tcPr>
+                </a:tc>
+                <a:tc>
+                  <a:txBody>
+                    <a:bodyPr/>
+                    <a:lstStyle/>
+                    <a:p>
+                      <a:pPr algn="ctr" marL="63500" marR="63500">
+                        <a:lnSpc>
+                          <a:spcPct val="100000"/>
+                        </a:lnSpc>
+                        <a:spcBef>
+                          <a:spcPts val="300"/>
+                        </a:spcBef>
+                        <a:spcAft>
+                          <a:spcPts val="300"/>
+                        </a:spcAft>
+                        <a:buNone/>
+                      </a:pPr>
+                      <a:r>
+                        <a:rPr cap="none" sz="1200" i="0" b="0" u="none">
+                          <a:solidFill>
+                            <a:srgbClr val="000000">
+                              <a:alpha val="100000"/>
+                            </a:srgbClr>
+                          </a:solidFill>
+                          <a:latin typeface="arial"/>
+                          <a:cs typeface="arial"/>
+                          <a:ea typeface="arial"/>
+                          <a:sym typeface="arial"/>
+                        </a:rPr>
+                        <a:t>231 (57.8%)</a:t>
+                      </a:r>
+                    </a:p>
+                  </a:txBody>
+                  <a:tcPr anchor="ctr" marB="38100" marT="38100" marR="0" marL="0">
+                    <a:lnL algn="ctr" cmpd="sng" cap="flat" w="0">
+                      <a:noFill/>
+                      <a:prstDash val="solid"/>
+                    </a:lnL>
+                    <a:lnR algn="ctr" cmpd="sng" cap="flat" w="0">
+                      <a:noFill/>
+                      <a:prstDash val="solid"/>
+                    </a:lnR>
+                    <a:lnT algn="ctr" cmpd="sng" cap="flat" w="0">
+                      <a:noFill/>
+                      <a:prstDash val="solid"/>
+                    </a:lnT>
+                    <a:lnB algn="ctr" cmpd="sng" cap="flat" w="0">
+                      <a:noFill/>
+                      <a:prstDash val="solid"/>
+                    </a:lnB>
+                    <a:solidFill>
+                      <a:srgbClr val="FFBD69">
+                        <a:alpha val="100000"/>
+                      </a:srgbClr>
+                    </a:solidFill>
+                  </a:tcPr>
+                </a:tc>
+                <a:tc>
+                  <a:txBody>
+                    <a:bodyPr/>
+                    <a:lstStyle/>
+                    <a:p>
+                      <a:pPr algn="ctr" marL="63500" marR="63500">
+                        <a:lnSpc>
+                          <a:spcPct val="100000"/>
+                        </a:lnSpc>
+                        <a:spcBef>
+                          <a:spcPts val="300"/>
+                        </a:spcBef>
+                        <a:spcAft>
+                          <a:spcPts val="300"/>
+                        </a:spcAft>
+                        <a:buNone/>
+                      </a:pPr>
+                      <a:r>
+                        <a:rPr cap="none" sz="1200" i="0" b="0" u="none">
+                          <a:solidFill>
+                            <a:srgbClr val="000000">
+                              <a:alpha val="100000"/>
+                            </a:srgbClr>
+                          </a:solidFill>
+                          <a:latin typeface="arial"/>
+                          <a:cs typeface="arial"/>
+                          <a:ea typeface="arial"/>
+                          <a:sym typeface="arial"/>
+                        </a:rPr>
+                        <a:t>231 (57.8%)</a:t>
+                      </a:r>
+                    </a:p>
+                  </a:txBody>
+                  <a:tcPr anchor="ctr" marB="38100" marT="38100" marR="0" marL="0">
+                    <a:lnL algn="ctr" cmpd="sng" cap="flat" w="0">
+                      <a:noFill/>
+                      <a:prstDash val="solid"/>
+                    </a:lnL>
+                    <a:lnR algn="ctr" cmpd="sng" cap="flat" w="0">
+                      <a:noFill/>
+                      <a:prstDash val="solid"/>
+                    </a:lnR>
+                    <a:lnT algn="ctr" cmpd="sng" cap="flat" w="0">
+                      <a:noFill/>
+                      <a:prstDash val="solid"/>
+                    </a:lnT>
+                    <a:lnB algn="ctr" cmpd="sng" cap="flat" w="0">
+                      <a:noFill/>
+                      <a:prstDash val="solid"/>
+                    </a:lnB>
+                    <a:solidFill>
+                      <a:srgbClr val="FFBD69">
+                        <a:alpha val="100000"/>
+                      </a:srgbClr>
+                    </a:solidFill>
+                  </a:tcPr>
+                </a:tc>
+              </a:tr>
+              <a:tr h="243582">
+                <a:tc>
+                  <a:txBody>
+                    <a:bodyPr/>
+                    <a:lstStyle/>
+                    <a:p>
+                      <a:pPr algn="l" marL="127000" marR="63500">
+                        <a:lnSpc>
+                          <a:spcPct val="100000"/>
+                        </a:lnSpc>
+                        <a:spcBef>
+                          <a:spcPts val="300"/>
+                        </a:spcBef>
+                        <a:spcAft>
+                          <a:spcPts val="300"/>
+                        </a:spcAft>
+                        <a:buNone/>
+                      </a:pPr>
+                      <a:r>
+                        <a:rPr cap="none" sz="1200" i="0" b="0" u="none">
+                          <a:solidFill>
+                            <a:srgbClr val="000000">
+                              <a:alpha val="100000"/>
+                            </a:srgbClr>
+                          </a:solidFill>
+                          <a:latin typeface="arial"/>
+                          <a:cs typeface="arial"/>
+                          <a:ea typeface="arial"/>
+                          <a:sym typeface="arial"/>
+                        </a:rPr>
+                        <a:t>M</a:t>
+                      </a:r>
+                    </a:p>
+                  </a:txBody>
+                  <a:tcPr anchor="ctr" marB="38100" marT="38100" marR="0" marL="0">
+                    <a:lnL algn="ctr" cmpd="sng" cap="flat" w="0">
+                      <a:noFill/>
+                      <a:prstDash val="solid"/>
+                    </a:lnL>
+                    <a:lnR algn="ctr" cmpd="sng" cap="flat" w="0">
+                      <a:noFill/>
+                      <a:prstDash val="solid"/>
+                    </a:lnR>
+                    <a:lnT algn="ctr" cmpd="sng" cap="flat" w="0">
+                      <a:noFill/>
+                      <a:prstDash val="solid"/>
+                    </a:lnT>
+                    <a:lnB algn="ctr" cmpd="sng" cap="flat" w="0">
+                      <a:noFill/>
+                      <a:prstDash val="solid"/>
+                    </a:lnB>
+                    <a:solidFill>
+                      <a:srgbClr val="FF7D29">
+                        <a:alpha val="100000"/>
+                      </a:srgbClr>
+                    </a:solidFill>
+                  </a:tcPr>
+                </a:tc>
+                <a:tc>
+                  <a:txBody>
+                    <a:bodyPr/>
+                    <a:lstStyle/>
+                    <a:p>
+                      <a:pPr algn="ctr" marL="63500" marR="63500">
+                        <a:lnSpc>
+                          <a:spcPct val="100000"/>
+                        </a:lnSpc>
+                        <a:spcBef>
+                          <a:spcPts val="300"/>
+                        </a:spcBef>
+                        <a:spcAft>
+                          <a:spcPts val="300"/>
+                        </a:spcAft>
+                        <a:buNone/>
+                      </a:pPr>
+                      <a:r>
+                        <a:rPr cap="none" sz="1200" i="0" b="0" u="none">
+                          <a:solidFill>
+                            <a:srgbClr val="000000">
+                              <a:alpha val="100000"/>
+                            </a:srgbClr>
+                          </a:solidFill>
+                          <a:latin typeface="arial"/>
+                          <a:cs typeface="arial"/>
+                          <a:ea typeface="arial"/>
+                          <a:sym typeface="arial"/>
+                        </a:rPr>
+                        <a:t>55 (41%)</a:t>
+                      </a:r>
+                    </a:p>
+                  </a:txBody>
+                  <a:tcPr anchor="ctr" marB="38100" marT="38100" marR="0" marL="0">
+                    <a:lnL algn="ctr" cmpd="sng" cap="flat" w="0">
+                      <a:noFill/>
+                      <a:prstDash val="solid"/>
+                    </a:lnL>
+                    <a:lnR algn="ctr" cmpd="sng" cap="flat" w="0">
+                      <a:noFill/>
+                      <a:prstDash val="solid"/>
+                    </a:lnR>
+                    <a:lnT algn="ctr" cmpd="sng" cap="flat" w="0">
+                      <a:noFill/>
+                      <a:prstDash val="solid"/>
+                    </a:lnT>
+                    <a:lnB algn="ctr" cmpd="sng" cap="flat" w="0">
+                      <a:noFill/>
+                      <a:prstDash val="solid"/>
+                    </a:lnB>
+                    <a:solidFill>
+                      <a:srgbClr val="FF7D29">
+                        <a:alpha val="100000"/>
+                      </a:srgbClr>
+                    </a:solidFill>
+                  </a:tcPr>
+                </a:tc>
+                <a:tc>
+                  <a:txBody>
+                    <a:bodyPr/>
+                    <a:lstStyle/>
+                    <a:p>
+                      <a:pPr algn="ctr" marL="63500" marR="63500">
+                        <a:lnSpc>
+                          <a:spcPct val="100000"/>
+                        </a:lnSpc>
+                        <a:spcBef>
+                          <a:spcPts val="300"/>
+                        </a:spcBef>
+                        <a:spcAft>
+                          <a:spcPts val="300"/>
+                        </a:spcAft>
+                        <a:buNone/>
+                      </a:pPr>
+                      <a:r>
+                        <a:rPr cap="none" sz="1200" i="0" b="0" u="none">
+                          <a:solidFill>
+                            <a:srgbClr val="000000">
+                              <a:alpha val="100000"/>
+                            </a:srgbClr>
+                          </a:solidFill>
+                          <a:latin typeface="arial"/>
+                          <a:cs typeface="arial"/>
+                          <a:ea typeface="arial"/>
+                          <a:sym typeface="arial"/>
+                        </a:rPr>
+                        <a:t>52 (38.8%)</a:t>
+                      </a:r>
+                    </a:p>
+                  </a:txBody>
+                  <a:tcPr anchor="ctr" marB="38100" marT="38100" marR="0" marL="0">
+                    <a:lnL algn="ctr" cmpd="sng" cap="flat" w="0">
+                      <a:noFill/>
+                      <a:prstDash val="solid"/>
+                    </a:lnL>
+                    <a:lnR algn="ctr" cmpd="sng" cap="flat" w="0">
+                      <a:noFill/>
+                      <a:prstDash val="solid"/>
+                    </a:lnR>
+                    <a:lnT algn="ctr" cmpd="sng" cap="flat" w="0">
+                      <a:noFill/>
+                      <a:prstDash val="solid"/>
+                    </a:lnT>
+                    <a:lnB algn="ctr" cmpd="sng" cap="flat" w="0">
+                      <a:noFill/>
+                      <a:prstDash val="solid"/>
+                    </a:lnB>
+                    <a:solidFill>
+                      <a:srgbClr val="FF7D29">
+                        <a:alpha val="100000"/>
+                      </a:srgbClr>
+                    </a:solidFill>
+                  </a:tcPr>
+                </a:tc>
+                <a:tc>
+                  <a:txBody>
+                    <a:bodyPr/>
+                    <a:lstStyle/>
+                    <a:p>
+                      <a:pPr algn="ctr" marL="63500" marR="63500">
+                        <a:lnSpc>
+                          <a:spcPct val="100000"/>
+                        </a:lnSpc>
+                        <a:spcBef>
+                          <a:spcPts val="300"/>
+                        </a:spcBef>
+                        <a:spcAft>
+                          <a:spcPts val="300"/>
+                        </a:spcAft>
+                        <a:buNone/>
+                      </a:pPr>
+                      <a:r>
+                        <a:rPr cap="none" sz="1200" i="0" b="0" u="none">
+                          <a:solidFill>
+                            <a:srgbClr val="000000">
+                              <a:alpha val="100000"/>
+                            </a:srgbClr>
+                          </a:solidFill>
+                          <a:latin typeface="arial"/>
+                          <a:cs typeface="arial"/>
+                          <a:ea typeface="arial"/>
+                          <a:sym typeface="arial"/>
+                        </a:rPr>
+                        <a:t>62 (47%)</a:t>
+                      </a:r>
+                    </a:p>
+                  </a:txBody>
+                  <a:tcPr anchor="ctr" marB="38100" marT="38100" marR="0" marL="0">
+                    <a:lnL algn="ctr" cmpd="sng" cap="flat" w="0">
+                      <a:noFill/>
+                      <a:prstDash val="solid"/>
+                    </a:lnL>
+                    <a:lnR algn="ctr" cmpd="sng" cap="flat" w="0">
+                      <a:noFill/>
+                      <a:prstDash val="solid"/>
+                    </a:lnR>
+                    <a:lnT algn="ctr" cmpd="sng" cap="flat" w="0">
+                      <a:noFill/>
+                      <a:prstDash val="solid"/>
+                    </a:lnT>
+                    <a:lnB algn="ctr" cmpd="sng" cap="flat" w="0">
+                      <a:noFill/>
+                      <a:prstDash val="solid"/>
+                    </a:lnB>
+                    <a:solidFill>
+                      <a:srgbClr val="FF7D29">
+                        <a:alpha val="100000"/>
+                      </a:srgbClr>
+                    </a:solidFill>
+                  </a:tcPr>
+                </a:tc>
+                <a:tc>
+                  <a:txBody>
+                    <a:bodyPr/>
+                    <a:lstStyle/>
+                    <a:p>
+                      <a:pPr algn="ctr" marL="63500" marR="63500">
+                        <a:lnSpc>
+                          <a:spcPct val="100000"/>
+                        </a:lnSpc>
+                        <a:spcBef>
+                          <a:spcPts val="300"/>
+                        </a:spcBef>
+                        <a:spcAft>
+                          <a:spcPts val="300"/>
+                        </a:spcAft>
+                        <a:buNone/>
+                      </a:pPr>
+                      <a:r>
+                        <a:rPr cap="none" sz="1200" i="0" b="0" u="none">
+                          <a:solidFill>
+                            <a:srgbClr val="000000">
+                              <a:alpha val="100000"/>
+                            </a:srgbClr>
+                          </a:solidFill>
+                          <a:latin typeface="arial"/>
+                          <a:cs typeface="arial"/>
+                          <a:ea typeface="arial"/>
+                          <a:sym typeface="arial"/>
+                        </a:rPr>
+                        <a:t>169 (42.2%)</a:t>
+                      </a:r>
+                    </a:p>
+                  </a:txBody>
+                  <a:tcPr anchor="ctr" marB="38100" marT="38100" marR="0" marL="0">
+                    <a:lnL algn="ctr" cmpd="sng" cap="flat" w="0">
+                      <a:noFill/>
+                      <a:prstDash val="solid"/>
+                    </a:lnL>
+                    <a:lnR algn="ctr" cmpd="sng" cap="flat" w="0">
+                      <a:noFill/>
+                      <a:prstDash val="solid"/>
+                    </a:lnR>
+                    <a:lnT algn="ctr" cmpd="sng" cap="flat" w="0">
+                      <a:noFill/>
+                      <a:prstDash val="solid"/>
+                    </a:lnT>
+                    <a:lnB algn="ctr" cmpd="sng" cap="flat" w="0">
+                      <a:noFill/>
+                      <a:prstDash val="solid"/>
+                    </a:lnB>
+                    <a:solidFill>
+                      <a:srgbClr val="FF7D29">
+                        <a:alpha val="100000"/>
+                      </a:srgbClr>
+                    </a:solidFill>
+                  </a:tcPr>
+                </a:tc>
+                <a:tc>
+                  <a:txBody>
+                    <a:bodyPr/>
+                    <a:lstStyle/>
+                    <a:p>
+                      <a:pPr algn="ctr" marL="63500" marR="63500">
+                        <a:lnSpc>
+                          <a:spcPct val="100000"/>
+                        </a:lnSpc>
+                        <a:spcBef>
+                          <a:spcPts val="300"/>
+                        </a:spcBef>
+                        <a:spcAft>
+                          <a:spcPts val="300"/>
+                        </a:spcAft>
+                        <a:buNone/>
+                      </a:pPr>
+                      <a:r>
+                        <a:rPr cap="none" sz="1200" i="0" b="0" u="none">
+                          <a:solidFill>
+                            <a:srgbClr val="000000">
+                              <a:alpha val="100000"/>
+                            </a:srgbClr>
+                          </a:solidFill>
+                          <a:latin typeface="arial"/>
+                          <a:cs typeface="arial"/>
+                          <a:ea typeface="arial"/>
+                          <a:sym typeface="arial"/>
+                        </a:rPr>
+                        <a:t>169 (42.2%)</a:t>
+                      </a:r>
+                    </a:p>
+                  </a:txBody>
+                  <a:tcPr anchor="ctr" marB="38100" marT="38100" marR="0" marL="0">
+                    <a:lnL algn="ctr" cmpd="sng" cap="flat" w="0">
+                      <a:noFill/>
+                      <a:prstDash val="solid"/>
+                    </a:lnL>
+                    <a:lnR algn="ctr" cmpd="sng" cap="flat" w="0">
+                      <a:noFill/>
+                      <a:prstDash val="solid"/>
+                    </a:lnR>
+                    <a:lnT algn="ctr" cmpd="sng" cap="flat" w="0">
+                      <a:noFill/>
+                      <a:prstDash val="solid"/>
+                    </a:lnT>
+                    <a:lnB algn="ctr" cmpd="sng" cap="flat" w="0">
+                      <a:noFill/>
+                      <a:prstDash val="solid"/>
+                    </a:lnB>
+                    <a:solidFill>
+                      <a:srgbClr val="FF7D29">
+                        <a:alpha val="100000"/>
+                      </a:srgbClr>
+                    </a:solidFill>
+                  </a:tcPr>
+                </a:tc>
+              </a:tr>
+              <a:tr h="238075">
+                <a:tc>
+                  <a:txBody>
+                    <a:bodyPr/>
+                    <a:lstStyle/>
+                    <a:p>
+                      <a:pPr algn="l" marL="127000" marR="63500">
+                        <a:lnSpc>
+                          <a:spcPct val="100000"/>
+                        </a:lnSpc>
+                        <a:spcBef>
+                          <a:spcPts val="300"/>
+                        </a:spcBef>
+                        <a:spcAft>
+                          <a:spcPts val="300"/>
+                        </a:spcAft>
+                        <a:buNone/>
+                      </a:pPr>
+                      <a:r>
+                        <a:rPr cap="none" sz="1200" i="0" b="0" u="none">
+                          <a:solidFill>
+                            <a:srgbClr val="000000">
+                              <a:alpha val="100000"/>
+                            </a:srgbClr>
+                          </a:solidFill>
+                          <a:latin typeface="arial"/>
+                          <a:cs typeface="arial"/>
+                          <a:ea typeface="arial"/>
+                          <a:sym typeface="arial"/>
+                        </a:rPr>
+                        <a:t>Age</a:t>
+                      </a:r>
+                    </a:p>
+                  </a:txBody>
+                  <a:tcPr anchor="ctr" marB="38100" marT="38100" marR="0" marL="0">
+                    <a:lnL algn="ctr" cmpd="sng" cap="flat" w="0">
+                      <a:noFill/>
+                      <a:prstDash val="solid"/>
+                    </a:lnL>
+                    <a:lnR algn="ctr" cmpd="sng" cap="flat" w="0">
+                      <a:noFill/>
+                      <a:prstDash val="solid"/>
+                    </a:lnR>
+                    <a:lnT algn="ctr" cmpd="sng" cap="flat" w="0">
+                      <a:noFill/>
+                      <a:prstDash val="solid"/>
+                    </a:lnT>
+                    <a:lnB algn="ctr" cmpd="sng" cap="flat" w="0">
+                      <a:noFill/>
+                      <a:prstDash val="solid"/>
+                    </a:lnB>
+                    <a:solidFill>
                       <a:srgbClr val="FFBD69">
                         <a:alpha val="100000"/>
                       </a:srgbClr>
@@ -4653,6 +4997,278 @@
                     </a:solidFill>
                   </a:tcPr>
                 </a:tc>
+                <a:tc>
+                  <a:txBody>
+                    <a:bodyPr/>
+                    <a:lstStyle/>
+                    <a:p>
+                      <a:pPr algn="ctr" marL="63500" marR="63500">
+                        <a:lnSpc>
+                          <a:spcPct val="100000"/>
+                        </a:lnSpc>
+                        <a:spcBef>
+                          <a:spcPts val="300"/>
+                        </a:spcBef>
+                        <a:spcAft>
+                          <a:spcPts val="300"/>
+                        </a:spcAft>
+                        <a:buNone/>
+                      </a:pPr>
+                      <a:endParaRPr cap="none" sz="1200" i="0" b="0" u="none">
+                        <a:solidFill>
+                          <a:srgbClr val="000000">
+                            <a:alpha val="100000"/>
+                          </a:srgbClr>
+                        </a:solidFill>
+                        <a:latin typeface="arial"/>
+                        <a:cs typeface="arial"/>
+                        <a:ea typeface="arial"/>
+                        <a:sym typeface="arial"/>
+                      </a:endParaRPr>
+                      <a:r>
+                        <a:rPr cap="none" sz="1200" i="0" b="0" u="none">
+                          <a:solidFill>
+                            <a:srgbClr val="000000">
+                              <a:alpha val="100000"/>
+                            </a:srgbClr>
+                          </a:solidFill>
+                          <a:latin typeface="arial"/>
+                          <a:cs typeface="arial"/>
+                          <a:ea typeface="arial"/>
+                          <a:sym typeface="arial"/>
+                        </a:rPr>
+                        <a:t/>
+                      </a:r>
+                    </a:p>
+                  </a:txBody>
+                  <a:tcPr anchor="ctr" marB="38100" marT="38100" marR="0" marL="0">
+                    <a:lnL algn="ctr" cmpd="sng" cap="flat" w="0">
+                      <a:noFill/>
+                      <a:prstDash val="solid"/>
+                    </a:lnL>
+                    <a:lnR algn="ctr" cmpd="sng" cap="flat" w="0">
+                      <a:noFill/>
+                      <a:prstDash val="solid"/>
+                    </a:lnR>
+                    <a:lnT algn="ctr" cmpd="sng" cap="flat" w="0">
+                      <a:noFill/>
+                      <a:prstDash val="solid"/>
+                    </a:lnT>
+                    <a:lnB algn="ctr" cmpd="sng" cap="flat" w="0">
+                      <a:noFill/>
+                      <a:prstDash val="solid"/>
+                    </a:lnB>
+                    <a:solidFill>
+                      <a:srgbClr val="FFBD69">
+                        <a:alpha val="100000"/>
+                      </a:srgbClr>
+                    </a:solidFill>
+                  </a:tcPr>
+                </a:tc>
+                <a:tc>
+                  <a:txBody>
+                    <a:bodyPr/>
+                    <a:lstStyle/>
+                    <a:p>
+                      <a:pPr algn="ctr" marL="63500" marR="63500">
+                        <a:lnSpc>
+                          <a:spcPct val="100000"/>
+                        </a:lnSpc>
+                        <a:spcBef>
+                          <a:spcPts val="300"/>
+                        </a:spcBef>
+                        <a:spcAft>
+                          <a:spcPts val="300"/>
+                        </a:spcAft>
+                        <a:buNone/>
+                      </a:pPr>
+                      <a:endParaRPr cap="none" sz="1200" i="0" b="0" u="none">
+                        <a:solidFill>
+                          <a:srgbClr val="000000">
+                            <a:alpha val="100000"/>
+                          </a:srgbClr>
+                        </a:solidFill>
+                        <a:latin typeface="arial"/>
+                        <a:cs typeface="arial"/>
+                        <a:ea typeface="arial"/>
+                        <a:sym typeface="arial"/>
+                      </a:endParaRPr>
+                      <a:r>
+                        <a:rPr cap="none" sz="1200" i="0" b="0" u="none">
+                          <a:solidFill>
+                            <a:srgbClr val="000000">
+                              <a:alpha val="100000"/>
+                            </a:srgbClr>
+                          </a:solidFill>
+                          <a:latin typeface="arial"/>
+                          <a:cs typeface="arial"/>
+                          <a:ea typeface="arial"/>
+                          <a:sym typeface="arial"/>
+                        </a:rPr>
+                        <a:t/>
+                      </a:r>
+                    </a:p>
+                  </a:txBody>
+                  <a:tcPr anchor="ctr" marB="38100" marT="38100" marR="0" marL="0">
+                    <a:lnL algn="ctr" cmpd="sng" cap="flat" w="0">
+                      <a:noFill/>
+                      <a:prstDash val="solid"/>
+                    </a:lnL>
+                    <a:lnR algn="ctr" cmpd="sng" cap="flat" w="0">
+                      <a:noFill/>
+                      <a:prstDash val="solid"/>
+                    </a:lnR>
+                    <a:lnT algn="ctr" cmpd="sng" cap="flat" w="0">
+                      <a:noFill/>
+                      <a:prstDash val="solid"/>
+                    </a:lnT>
+                    <a:lnB algn="ctr" cmpd="sng" cap="flat" w="0">
+                      <a:noFill/>
+                      <a:prstDash val="solid"/>
+                    </a:lnB>
+                    <a:solidFill>
+                      <a:srgbClr val="FFBD69">
+                        <a:alpha val="100000"/>
+                      </a:srgbClr>
+                    </a:solidFill>
+                  </a:tcPr>
+                </a:tc>
+                <a:tc>
+                  <a:txBody>
+                    <a:bodyPr/>
+                    <a:lstStyle/>
+                    <a:p>
+                      <a:pPr algn="ctr" marL="63500" marR="63500">
+                        <a:lnSpc>
+                          <a:spcPct val="100000"/>
+                        </a:lnSpc>
+                        <a:spcBef>
+                          <a:spcPts val="300"/>
+                        </a:spcBef>
+                        <a:spcAft>
+                          <a:spcPts val="300"/>
+                        </a:spcAft>
+                        <a:buNone/>
+                      </a:pPr>
+                      <a:endParaRPr cap="none" sz="1200" i="0" b="0" u="none">
+                        <a:solidFill>
+                          <a:srgbClr val="000000">
+                            <a:alpha val="100000"/>
+                          </a:srgbClr>
+                        </a:solidFill>
+                        <a:latin typeface="arial"/>
+                        <a:cs typeface="arial"/>
+                        <a:ea typeface="arial"/>
+                        <a:sym typeface="arial"/>
+                      </a:endParaRPr>
+                      <a:r>
+                        <a:rPr cap="none" sz="1200" i="0" b="0" u="none">
+                          <a:solidFill>
+                            <a:srgbClr val="000000">
+                              <a:alpha val="100000"/>
+                            </a:srgbClr>
+                          </a:solidFill>
+                          <a:latin typeface="arial"/>
+                          <a:cs typeface="arial"/>
+                          <a:ea typeface="arial"/>
+                          <a:sym typeface="arial"/>
+                        </a:rPr>
+                        <a:t/>
+                      </a:r>
+                    </a:p>
+                  </a:txBody>
+                  <a:tcPr anchor="ctr" marB="38100" marT="38100" marR="0" marL="0">
+                    <a:lnL algn="ctr" cmpd="sng" cap="flat" w="0">
+                      <a:noFill/>
+                      <a:prstDash val="solid"/>
+                    </a:lnL>
+                    <a:lnR algn="ctr" cmpd="sng" cap="flat" w="0">
+                      <a:noFill/>
+                      <a:prstDash val="solid"/>
+                    </a:lnR>
+                    <a:lnT algn="ctr" cmpd="sng" cap="flat" w="0">
+                      <a:noFill/>
+                      <a:prstDash val="solid"/>
+                    </a:lnT>
+                    <a:lnB algn="ctr" cmpd="sng" cap="flat" w="0">
+                      <a:noFill/>
+                      <a:prstDash val="solid"/>
+                    </a:lnB>
+                    <a:solidFill>
+                      <a:srgbClr val="FFBD69">
+                        <a:alpha val="100000"/>
+                      </a:srgbClr>
+                    </a:solidFill>
+                  </a:tcPr>
+                </a:tc>
+                <a:tc>
+                  <a:txBody>
+                    <a:bodyPr/>
+                    <a:lstStyle/>
+                    <a:p>
+                      <a:pPr algn="ctr" marL="63500" marR="63500">
+                        <a:lnSpc>
+                          <a:spcPct val="100000"/>
+                        </a:lnSpc>
+                        <a:spcBef>
+                          <a:spcPts val="300"/>
+                        </a:spcBef>
+                        <a:spcAft>
+                          <a:spcPts val="300"/>
+                        </a:spcAft>
+                        <a:buNone/>
+                      </a:pPr>
+                      <a:endParaRPr cap="none" sz="1200" i="0" b="0" u="none">
+                        <a:solidFill>
+                          <a:srgbClr val="000000">
+                            <a:alpha val="100000"/>
+                          </a:srgbClr>
+                        </a:solidFill>
+                        <a:latin typeface="arial"/>
+                        <a:cs typeface="arial"/>
+                        <a:ea typeface="arial"/>
+                        <a:sym typeface="arial"/>
+                      </a:endParaRPr>
+                      <a:r>
+                        <a:rPr cap="none" sz="1200" i="0" b="0" u="none">
+                          <a:solidFill>
+                            <a:srgbClr val="000000">
+                              <a:alpha val="100000"/>
+                            </a:srgbClr>
+                          </a:solidFill>
+                          <a:latin typeface="arial"/>
+                          <a:cs typeface="arial"/>
+                          <a:ea typeface="arial"/>
+                          <a:sym typeface="arial"/>
+                        </a:rPr>
+                        <a:t/>
+                      </a:r>
+                    </a:p>
+                  </a:txBody>
+                  <a:tcPr anchor="ctr" marB="38100" marT="38100" marR="0" marL="0">
+                    <a:lnL algn="ctr" cmpd="sng" cap="flat" w="0">
+                      <a:noFill/>
+                      <a:prstDash val="solid"/>
+                    </a:lnL>
+                    <a:lnR algn="ctr" cmpd="sng" cap="flat" w="0">
+                      <a:noFill/>
+                      <a:prstDash val="solid"/>
+                    </a:lnR>
+                    <a:lnT algn="ctr" cmpd="sng" cap="flat" w="0">
+                      <a:noFill/>
+                      <a:prstDash val="solid"/>
+                    </a:lnT>
+                    <a:lnB algn="ctr" cmpd="sng" cap="flat" w="0">
+                      <a:noFill/>
+                      <a:prstDash val="solid"/>
+                    </a:lnB>
+                    <a:solidFill>
+                      <a:srgbClr val="FFBD69">
+                        <a:alpha val="100000"/>
+                      </a:srgbClr>
+                    </a:solidFill>
+                  </a:tcPr>
+                </a:tc>
               </a:tr>
               <a:tr h="213519">
                 <a:tc>
@@ -4741,7 +5357,7 @@
                           <a:ea typeface="arial"/>
                           <a:sym typeface="arial"/>
                         </a:rPr>
-                        <a:t>33.0</a:t>
+                        <a:t>33.00</a:t>
                       </a:r>
                     </a:p>
                   </a:txBody>
@@ -4798,7 +5414,7 @@
                           <a:ea typeface="arial"/>
                           <a:sym typeface="arial"/>
                         </a:rPr>
-                        <a:t>35.0</a:t>
+                        <a:t>35.00</a:t>
                       </a:r>
                     </a:p>
                   </a:txBody>
@@ -4855,7 +5471,121 @@
                           <a:ea typeface="arial"/>
                           <a:sym typeface="arial"/>
                         </a:rPr>
-                        <a:t>35.0</a:t>
+                        <a:t>35.00</a:t>
+                      </a:r>
+                    </a:p>
+                  </a:txBody>
+                  <a:tcPr anchor="ctr" marB="38100" marT="38100" marR="0" marL="0">
+                    <a:lnL algn="ctr" cmpd="sng" cap="flat" w="0">
+                      <a:noFill/>
+                      <a:prstDash val="solid"/>
+                    </a:lnL>
+                    <a:lnR algn="ctr" cmpd="sng" cap="flat" w="0">
+                      <a:noFill/>
+                      <a:prstDash val="solid"/>
+                    </a:lnR>
+                    <a:lnT algn="ctr" cmpd="sng" cap="flat" w="0">
+                      <a:noFill/>
+                      <a:prstDash val="solid"/>
+                    </a:lnT>
+                    <a:lnB algn="ctr" cmpd="sng" cap="flat" w="0">
+                      <a:noFill/>
+                      <a:prstDash val="solid"/>
+                    </a:lnB>
+                    <a:solidFill>
+                      <a:srgbClr val="FF7D29">
+                        <a:alpha val="100000"/>
+                      </a:srgbClr>
+                    </a:solidFill>
+                  </a:tcPr>
+                </a:tc>
+                <a:tc>
+                  <a:txBody>
+                    <a:bodyPr/>
+                    <a:lstStyle/>
+                    <a:p>
+                      <a:pPr algn="ctr" marL="63500" marR="63500">
+                        <a:lnSpc>
+                          <a:spcPct val="100000"/>
+                        </a:lnSpc>
+                        <a:spcBef>
+                          <a:spcPts val="300"/>
+                        </a:spcBef>
+                        <a:spcAft>
+                          <a:spcPts val="300"/>
+                        </a:spcAft>
+                        <a:buNone/>
+                      </a:pPr>
+                      <a:r>
+                        <a:rPr cap="none" sz="1200" i="0" b="0" u="none">
+                          <a:solidFill>
+                            <a:srgbClr val="000000">
+                              <a:alpha val="100000"/>
+                            </a:srgbClr>
+                          </a:solidFill>
+                          <a:latin typeface="arial"/>
+                          <a:cs typeface="arial"/>
+                          <a:ea typeface="arial"/>
+                          <a:sym typeface="arial"/>
+                        </a:rPr>
+                        <a:t>34.00</a:t>
+                      </a:r>
+                    </a:p>
+                  </a:txBody>
+                  <a:tcPr anchor="ctr" marB="38100" marT="38100" marR="0" marL="0">
+                    <a:lnL algn="ctr" cmpd="sng" cap="flat" w="0">
+                      <a:noFill/>
+                      <a:prstDash val="solid"/>
+                    </a:lnL>
+                    <a:lnR algn="ctr" cmpd="sng" cap="flat" w="0">
+                      <a:noFill/>
+                      <a:prstDash val="solid"/>
+                    </a:lnR>
+                    <a:lnT algn="ctr" cmpd="sng" cap="flat" w="0">
+                      <a:noFill/>
+                      <a:prstDash val="solid"/>
+                    </a:lnT>
+                    <a:lnB algn="ctr" cmpd="sng" cap="flat" w="0">
+                      <a:noFill/>
+                      <a:prstDash val="solid"/>
+                    </a:lnB>
+                    <a:solidFill>
+                      <a:srgbClr val="FF7D29">
+                        <a:alpha val="100000"/>
+                      </a:srgbClr>
+                    </a:solidFill>
+                  </a:tcPr>
+                </a:tc>
+                <a:tc>
+                  <a:txBody>
+                    <a:bodyPr/>
+                    <a:lstStyle/>
+                    <a:p>
+                      <a:pPr algn="ctr" marL="63500" marR="63500">
+                        <a:lnSpc>
+                          <a:spcPct val="100000"/>
+                        </a:lnSpc>
+                        <a:spcBef>
+                          <a:spcPts val="300"/>
+                        </a:spcBef>
+                        <a:spcAft>
+                          <a:spcPts val="300"/>
+                        </a:spcAft>
+                        <a:buNone/>
+                      </a:pPr>
+                      <a:r>
+                        <a:rPr cap="none" sz="1200" i="0" b="0" u="none">
+                          <a:solidFill>
+                            <a:srgbClr val="000000">
+                              <a:alpha val="100000"/>
+                            </a:srgbClr>
+                          </a:solidFill>
+                          <a:latin typeface="arial"/>
+                          <a:cs typeface="arial"/>
+                          <a:ea typeface="arial"/>
+                          <a:sym typeface="arial"/>
+                        </a:rPr>
+                        <a:t>34.00</a:t>
                       </a:r>
                     </a:p>
                   </a:txBody>
@@ -5113,9 +5843,123 @@
                     </a:solidFill>
                   </a:tcPr>
                 </a:tc>
+                <a:tc>
+                  <a:txBody>
+                    <a:bodyPr/>
+                    <a:lstStyle/>
+                    <a:p>
+                      <a:pPr algn="ctr" marL="63500" marR="63500">
+                        <a:lnSpc>
+                          <a:spcPct val="100000"/>
+                        </a:lnSpc>
+                        <a:spcBef>
+                          <a:spcPts val="300"/>
+                        </a:spcBef>
+                        <a:spcAft>
+                          <a:spcPts val="300"/>
+                        </a:spcAft>
+                        <a:buNone/>
+                      </a:pPr>
+                      <a:r>
+                        <a:rPr cap="none" sz="1200" i="0" b="0" u="none">
+                          <a:solidFill>
+                            <a:srgbClr val="000000">
+                              <a:alpha val="100000"/>
+                            </a:srgbClr>
+                          </a:solidFill>
+                          <a:latin typeface="arial"/>
+                          <a:cs typeface="arial"/>
+                          <a:ea typeface="arial"/>
+                          <a:sym typeface="arial"/>
+                        </a:rPr>
+                        <a:t>20.0 - 69.0</a:t>
+                      </a:r>
+                    </a:p>
+                  </a:txBody>
+                  <a:tcPr anchor="ctr" marB="38100" marT="38100" marR="0" marL="0">
+                    <a:lnL algn="ctr" cmpd="sng" cap="flat" w="0">
+                      <a:noFill/>
+                      <a:prstDash val="solid"/>
+                    </a:lnL>
+                    <a:lnR algn="ctr" cmpd="sng" cap="flat" w="0">
+                      <a:noFill/>
+                      <a:prstDash val="solid"/>
+                    </a:lnR>
+                    <a:lnT algn="ctr" cmpd="sng" cap="flat" w="0">
+                      <a:noFill/>
+                      <a:prstDash val="solid"/>
+                    </a:lnT>
+                    <a:lnB algn="ctr" cmpd="sng" cap="flat" w="0">
+                      <a:noFill/>
+                      <a:prstDash val="solid"/>
+                    </a:lnB>
+                    <a:solidFill>
+                      <a:srgbClr val="FFBD69">
+                        <a:alpha val="100000"/>
+                      </a:srgbClr>
+                    </a:solidFill>
+                  </a:tcPr>
+                </a:tc>
+                <a:tc>
+                  <a:txBody>
+                    <a:bodyPr/>
+                    <a:lstStyle/>
+                    <a:p>
+                      <a:pPr algn="ctr" marL="63500" marR="63500">
+                        <a:lnSpc>
+                          <a:spcPct val="100000"/>
+                        </a:lnSpc>
+                        <a:spcBef>
+                          <a:spcPts val="300"/>
+                        </a:spcBef>
+                        <a:spcAft>
+                          <a:spcPts val="300"/>
+                        </a:spcAft>
+                        <a:buNone/>
+                      </a:pPr>
+                      <a:r>
+                        <a:rPr cap="none" sz="1200" i="0" b="0" u="none">
+                          <a:solidFill>
+                            <a:srgbClr val="000000">
+                              <a:alpha val="100000"/>
+                            </a:srgbClr>
+                          </a:solidFill>
+                          <a:latin typeface="arial"/>
+                          <a:cs typeface="arial"/>
+                          <a:ea typeface="arial"/>
+                          <a:sym typeface="arial"/>
+                        </a:rPr>
+                        <a:t>20.0 - 69.0</a:t>
+                      </a:r>
+                    </a:p>
+                  </a:txBody>
+                  <a:tcPr anchor="ctr" marB="38100" marT="38100" marR="0" marL="0">
+                    <a:lnL algn="ctr" cmpd="sng" cap="flat" w="0">
+                      <a:noFill/>
+                      <a:prstDash val="solid"/>
+                    </a:lnL>
+                    <a:lnR algn="ctr" cmpd="sng" cap="flat" w="0">
+                      <a:noFill/>
+                      <a:prstDash val="solid"/>
+                    </a:lnR>
+                    <a:lnT algn="ctr" cmpd="sng" cap="flat" w="0">
+                      <a:noFill/>
+                      <a:prstDash val="solid"/>
+                    </a:lnT>
+                    <a:lnB algn="ctr" cmpd="sng" cap="flat" w="0">
+                      <a:noFill/>
+                      <a:prstDash val="solid"/>
+                    </a:lnB>
+                    <a:solidFill>
+                      <a:srgbClr val="FFBD69">
+                        <a:alpha val="100000"/>
+                      </a:srgbClr>
+                    </a:solidFill>
+                  </a:tcPr>
+                </a:tc>
               </a:tr>
               <a:tr h="228600">
-                <a:tc gridSpan="4">
+                <a:tc gridSpan="6">
                   <a:txBody>
                     <a:bodyPr/>
                     <a:lstStyle/>
@@ -5187,6 +6031,142 @@
                           <a:sym typeface="DejaVu Sans"/>
                         </a:rPr>
                         <a:t>; </a:t>
+                      </a:r>
+                    </a:p>
+                  </a:txBody>
+                  <a:tcPr anchor="ctr" marB="63500" marT="63500" marR="0" marL="0">
+                    <a:lnL algn="ctr" cmpd="sng" cap="flat" w="0">
+                      <a:noFill/>
+                      <a:prstDash val="solid"/>
+                    </a:lnL>
+                    <a:lnR algn="ctr" cmpd="sng" cap="flat" w="0">
+                      <a:noFill/>
+                      <a:prstDash val="solid"/>
+                    </a:lnR>
+                    <a:lnT algn="ctr" cmpd="sng" cap="flat" w="0">
+                      <a:noFill/>
+                      <a:prstDash val="solid"/>
+                    </a:lnT>
+                    <a:lnB algn="ctr" cmpd="sng" cap="flat" w="0">
+                      <a:noFill/>
+                      <a:prstDash val="solid"/>
+                    </a:lnB>
+                    <a:solidFill>
+                      <a:srgbClr val="FFFFFF">
+                        <a:alpha val="0"/>
+                      </a:srgbClr>
+                    </a:solidFill>
+                  </a:tcPr>
+                </a:tc>
+                <a:tc hMerge="true">
+                  <a:txBody>
+                    <a:bodyPr/>
+                    <a:lstStyle/>
+                    <a:p>
+                      <a:pPr algn="l" marL="63500" marR="63500">
+                        <a:lnSpc>
+                          <a:spcPct val="100000"/>
+                        </a:lnSpc>
+                        <a:spcBef>
+                          <a:spcPts val="500"/>
+                        </a:spcBef>
+                        <a:spcAft>
+                          <a:spcPts val="500"/>
+                        </a:spcAft>
+                        <a:buNone/>
+                      </a:pPr>
+                      <a:endParaRPr cap="none" sz="1100" i="0" b="0" u="none">
+                        <a:solidFill>
+                          <a:srgbClr val="000000">
+                            <a:alpha val="100000"/>
+                          </a:srgbClr>
+                        </a:solidFill>
+                        <a:latin typeface="DejaVu Sans"/>
+                        <a:cs typeface="DejaVu Sans"/>
+                        <a:ea typeface="DejaVu Sans"/>
+                        <a:sym typeface="DejaVu Sans"/>
+                      </a:endParaRPr>
+                      <a:r>
+                        <a:rPr cap="none" sz="1100" i="0" b="0" u="none">
+                          <a:solidFill>
+                            <a:srgbClr val="000000">
+                              <a:alpha val="100000"/>
+                            </a:srgbClr>
+                          </a:solidFill>
+                          <a:latin typeface="DejaVu Sans"/>
+                          <a:cs typeface="DejaVu Sans"/>
+                          <a:ea typeface="DejaVu Sans"/>
+                          <a:sym typeface="DejaVu Sans"/>
+                        </a:rPr>
+                        <a:t/>
+                      </a:r>
+                    </a:p>
+                  </a:txBody>
+                  <a:tcPr anchor="ctr" marB="63500" marT="63500" marR="0" marL="0">
+                    <a:lnL algn="ctr" cmpd="sng" cap="flat" w="0">
+                      <a:noFill/>
+                      <a:prstDash val="solid"/>
+                    </a:lnL>
+                    <a:lnR algn="ctr" cmpd="sng" cap="flat" w="0">
+                      <a:noFill/>
+                      <a:prstDash val="solid"/>
+                    </a:lnR>
+                    <a:lnT algn="ctr" cmpd="sng" cap="flat" w="0">
+                      <a:noFill/>
+                      <a:prstDash val="solid"/>
+                    </a:lnT>
+                    <a:lnB algn="ctr" cmpd="sng" cap="flat" w="0">
+                      <a:noFill/>
+                      <a:prstDash val="solid"/>
+                    </a:lnB>
+                    <a:solidFill>
+                      <a:srgbClr val="FFFFFF">
+                        <a:alpha val="0"/>
+                      </a:srgbClr>
+                    </a:solidFill>
+                  </a:tcPr>
+                </a:tc>
+                <a:tc hMerge="true">
+                  <a:txBody>
+                    <a:bodyPr/>
+                    <a:lstStyle/>
+                    <a:p>
+                      <a:pPr algn="l" marL="63500" marR="63500">
+                        <a:lnSpc>
+                          <a:spcPct val="100000"/>
+                        </a:lnSpc>
+                        <a:spcBef>
+                          <a:spcPts val="500"/>
+                        </a:spcBef>
+                        <a:spcAft>
+                          <a:spcPts val="500"/>
+                        </a:spcAft>
+                        <a:buNone/>
+                      </a:pPr>
+                      <a:endParaRPr cap="none" sz="1100" i="0" b="0" u="none">
+                        <a:solidFill>
+                          <a:srgbClr val="000000">
+                            <a:alpha val="100000"/>
+                          </a:srgbClr>
+                        </a:solidFill>
+                        <a:latin typeface="DejaVu Sans"/>
+                        <a:cs typeface="DejaVu Sans"/>
+                        <a:ea typeface="DejaVu Sans"/>
+                        <a:sym typeface="DejaVu Sans"/>
+                      </a:endParaRPr>
+                      <a:r>
+                        <a:rPr cap="none" sz="1100" i="0" b="0" u="none">
+                          <a:solidFill>
+                            <a:srgbClr val="000000">
+                              <a:alpha val="100000"/>
+                            </a:srgbClr>
+                          </a:solidFill>
+                          <a:latin typeface="DejaVu Sans"/>
+                          <a:cs typeface="DejaVu Sans"/>
+                          <a:ea typeface="DejaVu Sans"/>
+                          <a:sym typeface="DejaVu Sans"/>
+                        </a:rPr>
+                        <a:t/>
                       </a:r>
                     </a:p>
                   </a:txBody>

</xml_diff>